<commit_message>
Assignment 3 & 5
I wasn't entirely certain what #3 was asking for, however my attempt to truncate the .txt filetype was unsuccessful.  Spaces parse fine.
</commit_message>
<xml_diff>
--- a/TriviaNight.pptx
+++ b/TriviaNight.pptx
@@ -3376,7 +3376,7 @@
             <a:pPr algn="l"/>
             <a:r>
               <a:rPr lang="en-US" sz="3600"/>
-              <a:t>category_name_09.txt</a:t>
+              <a:t>Category: Category 1.txt</a:t>
             </a:r>
             <a:endParaRPr lang="en-US" sz="1100"/>
           </a:p>
@@ -3457,7 +3457,7 @@
             <a:pPr algn="l"/>
             <a:r>
               <a:rPr lang="en-US" sz="3600"/>
-              <a:t>category_name_03.txt</a:t>
+              <a:t>Category: Category 7.txt</a:t>
             </a:r>
             <a:endParaRPr lang="en-US" sz="1100"/>
           </a:p>
@@ -3485,7 +3485,7 @@
             <a:pPr algn="l"/>
             <a:r>
               <a:rPr lang="en-US" sz="4400"/>
-              <a:t>Question 3 of 10 in round 9</a:t>
+              <a:t>Question 3 of 10 in round 8</a:t>
             </a:r>
             <a:endParaRPr lang="en-US" sz="1100"/>
           </a:p>
@@ -3538,7 +3538,7 @@
             <a:pPr algn="l"/>
             <a:r>
               <a:rPr lang="en-US" sz="3600"/>
-              <a:t>category_name_04.txt</a:t>
+              <a:t>Category: Category 7.txt</a:t>
             </a:r>
             <a:endParaRPr lang="en-US" sz="1100"/>
           </a:p>
@@ -3566,7 +3566,7 @@
             <a:pPr algn="l"/>
             <a:r>
               <a:rPr lang="en-US" sz="4400"/>
-              <a:t>Question 4 of 10 in round 9</a:t>
+              <a:t>Question 4 of 10 in round 8</a:t>
             </a:r>
             <a:endParaRPr lang="en-US" sz="1100"/>
           </a:p>
@@ -3619,7 +3619,7 @@
             <a:pPr algn="l"/>
             <a:r>
               <a:rPr lang="en-US" sz="3600"/>
-              <a:t>category_name_05.txt</a:t>
+              <a:t>Category: Category 7.txt</a:t>
             </a:r>
             <a:endParaRPr lang="en-US" sz="1100"/>
           </a:p>
@@ -3647,7 +3647,7 @@
             <a:pPr algn="l"/>
             <a:r>
               <a:rPr lang="en-US" sz="4400"/>
-              <a:t>Question 5 of 10 in round 9</a:t>
+              <a:t>Question 5 of 10 in round 8</a:t>
             </a:r>
             <a:endParaRPr lang="en-US" sz="1100"/>
           </a:p>
@@ -3700,7 +3700,7 @@
             <a:pPr algn="l"/>
             <a:r>
               <a:rPr lang="en-US" sz="3600"/>
-              <a:t>category_name_06.txt</a:t>
+              <a:t>Category: Category 7.txt</a:t>
             </a:r>
             <a:endParaRPr lang="en-US" sz="1100"/>
           </a:p>
@@ -3728,7 +3728,7 @@
             <a:pPr algn="l"/>
             <a:r>
               <a:rPr lang="en-US" sz="4400"/>
-              <a:t>Question 6 of 10 in round 9</a:t>
+              <a:t>Question 6 of 10 in round 8</a:t>
             </a:r>
             <a:endParaRPr lang="en-US" sz="1100"/>
           </a:p>
@@ -3781,7 +3781,7 @@
             <a:pPr algn="l"/>
             <a:r>
               <a:rPr lang="en-US" sz="3600"/>
-              <a:t>category_name_07.txt</a:t>
+              <a:t>Category: Category 7.txt</a:t>
             </a:r>
             <a:endParaRPr lang="en-US" sz="1100"/>
           </a:p>
@@ -3809,7 +3809,7 @@
             <a:pPr algn="l"/>
             <a:r>
               <a:rPr lang="en-US" sz="4400"/>
-              <a:t>Question 7 of 10 in round 9</a:t>
+              <a:t>Question 7 of 10 in round 8</a:t>
             </a:r>
             <a:endParaRPr lang="en-US" sz="1100"/>
           </a:p>
@@ -3862,7 +3862,7 @@
             <a:pPr algn="l"/>
             <a:r>
               <a:rPr lang="en-US" sz="3600"/>
-              <a:t>category_name_08.txt</a:t>
+              <a:t>Category: Category 7.txt</a:t>
             </a:r>
             <a:endParaRPr lang="en-US" sz="1100"/>
           </a:p>
@@ -3890,7 +3890,7 @@
             <a:pPr algn="l"/>
             <a:r>
               <a:rPr lang="en-US" sz="4400"/>
-              <a:t>Question 8 of 10 in round 9</a:t>
+              <a:t>Question 8 of 10 in round 8</a:t>
             </a:r>
             <a:endParaRPr lang="en-US" sz="1100"/>
           </a:p>
@@ -3943,7 +3943,7 @@
             <a:pPr algn="l"/>
             <a:r>
               <a:rPr lang="en-US" sz="3600"/>
-              <a:t>category_name_09.txt</a:t>
+              <a:t>Category: Category 7.txt</a:t>
             </a:r>
             <a:endParaRPr lang="en-US" sz="1100"/>
           </a:p>
@@ -3971,7 +3971,7 @@
             <a:pPr algn="l"/>
             <a:r>
               <a:rPr lang="en-US" sz="4400"/>
-              <a:t>Question 9 of 10 in round 9</a:t>
+              <a:t>Question 9 of 10 in round 8</a:t>
             </a:r>
             <a:endParaRPr lang="en-US" sz="1100"/>
           </a:p>
@@ -4024,7 +4024,7 @@
             <a:pPr algn="l"/>
             <a:r>
               <a:rPr lang="en-US" sz="3600"/>
-              <a:t>category_name_10.txt</a:t>
+              <a:t>Category: Category 7.txt</a:t>
             </a:r>
             <a:endParaRPr lang="en-US" sz="1100"/>
           </a:p>
@@ -4052,7 +4052,7 @@
             <a:pPr algn="l"/>
             <a:r>
               <a:rPr lang="en-US" sz="4400"/>
-              <a:t>Question 10 of 10 in round 9</a:t>
+              <a:t>Question 10 of 10 in round 8</a:t>
             </a:r>
             <a:endParaRPr lang="en-US" sz="1100"/>
           </a:p>
@@ -4105,7 +4105,7 @@
             <a:pPr algn="l"/>
             <a:r>
               <a:rPr lang="en-US" sz="3600"/>
-              <a:t>Answer 1 of 10 in round 9</a:t>
+              <a:t>Answer 1 of 10 in round 8</a:t>
             </a:r>
             <a:endParaRPr lang="en-US" sz="1100"/>
           </a:p>
@@ -4133,7 +4133,7 @@
             <a:pPr algn="l"/>
             <a:r>
               <a:rPr lang="en-US" sz="3600"/>
-              <a:t>Answer 2 of 10 in round 9</a:t>
+              <a:t>Answer 2 of 10 in round 8</a:t>
             </a:r>
             <a:endParaRPr lang="en-US" sz="1100"/>
           </a:p>
@@ -4161,7 +4161,7 @@
             <a:pPr algn="l"/>
             <a:r>
               <a:rPr lang="en-US" sz="3600"/>
-              <a:t>Answer 3 of 10 in round 9</a:t>
+              <a:t>Answer 3 of 10 in round 8</a:t>
             </a:r>
             <a:endParaRPr lang="en-US" sz="1100"/>
           </a:p>
@@ -4189,7 +4189,7 @@
             <a:pPr algn="l"/>
             <a:r>
               <a:rPr lang="en-US" sz="3600"/>
-              <a:t>Answer 4 of 10 in round 9</a:t>
+              <a:t>Answer 4 of 10 in round 8</a:t>
             </a:r>
             <a:endParaRPr lang="en-US" sz="1100"/>
           </a:p>
@@ -4217,7 +4217,7 @@
             <a:pPr algn="l"/>
             <a:r>
               <a:rPr lang="en-US" sz="3600"/>
-              <a:t>Answer 5 of 10 in round 9</a:t>
+              <a:t>Answer 5 of 10 in round 8</a:t>
             </a:r>
             <a:endParaRPr lang="en-US" sz="1100"/>
           </a:p>
@@ -4245,7 +4245,7 @@
             <a:pPr algn="l"/>
             <a:r>
               <a:rPr lang="en-US" sz="3600"/>
-              <a:t>Answer 6 of 10 in round 9</a:t>
+              <a:t>Answer 6 of 10 in round 8</a:t>
             </a:r>
             <a:endParaRPr lang="en-US" sz="1100"/>
           </a:p>
@@ -4273,7 +4273,7 @@
             <a:pPr algn="l"/>
             <a:r>
               <a:rPr lang="en-US" sz="3600"/>
-              <a:t>Answer 7 of 10 in round 9</a:t>
+              <a:t>Answer 7 of 10 in round 8</a:t>
             </a:r>
             <a:endParaRPr lang="en-US" sz="1100"/>
           </a:p>
@@ -4301,7 +4301,7 @@
             <a:pPr algn="l"/>
             <a:r>
               <a:rPr lang="en-US" sz="3600"/>
-              <a:t>Answer 8 of 10 in round 9</a:t>
+              <a:t>Answer 8 of 10 in round 8</a:t>
             </a:r>
             <a:endParaRPr lang="en-US" sz="1100"/>
           </a:p>
@@ -4329,7 +4329,7 @@
             <a:pPr algn="l"/>
             <a:r>
               <a:rPr lang="en-US" sz="3600"/>
-              <a:t>Answer 9 of 10 in round 9</a:t>
+              <a:t>Answer 9 of 10 in round 8</a:t>
             </a:r>
             <a:endParaRPr lang="en-US" sz="1100"/>
           </a:p>
@@ -4357,7 +4357,7 @@
             <a:pPr algn="l"/>
             <a:r>
               <a:rPr lang="en-US" sz="3600"/>
-              <a:t>Answer 10 of 10 in round 9</a:t>
+              <a:t>Answer 10 of 10 in round 8</a:t>
             </a:r>
             <a:endParaRPr lang="en-US" sz="1100"/>
           </a:p>
@@ -4586,7 +4586,7 @@
             <a:pPr algn="l"/>
             <a:r>
               <a:rPr lang="en-US" sz="3600"/>
-              <a:t>category_name_10.txt</a:t>
+              <a:t>Category: Category 1.txt</a:t>
             </a:r>
             <a:endParaRPr lang="en-US" sz="1100"/>
           </a:p>
@@ -4667,7 +4667,7 @@
             <a:pPr algn="l"/>
             <a:r>
               <a:rPr lang="en-US" sz="3600"/>
-              <a:t>category_name_01.txt</a:t>
+              <a:t>Category: Category 3.txt</a:t>
             </a:r>
             <a:endParaRPr lang="en-US" sz="1100"/>
           </a:p>
@@ -4695,7 +4695,7 @@
             <a:pPr algn="l"/>
             <a:r>
               <a:rPr lang="en-US" sz="4400"/>
-              <a:t>Question 1 of 10 in round 10</a:t>
+              <a:t>Question 1 of 10 in round 9</a:t>
             </a:r>
             <a:endParaRPr lang="en-US" sz="1100"/>
           </a:p>
@@ -4748,7 +4748,7 @@
             <a:pPr algn="l"/>
             <a:r>
               <a:rPr lang="en-US" sz="3600"/>
-              <a:t>category_name_02.txt</a:t>
+              <a:t>Category: Category 3.txt</a:t>
             </a:r>
             <a:endParaRPr lang="en-US" sz="1100"/>
           </a:p>
@@ -4776,7 +4776,7 @@
             <a:pPr algn="l"/>
             <a:r>
               <a:rPr lang="en-US" sz="4400"/>
-              <a:t>Question 2 of 10 in round 10</a:t>
+              <a:t>Question 2 of 10 in round 9</a:t>
             </a:r>
             <a:endParaRPr lang="en-US" sz="1100"/>
           </a:p>
@@ -4829,7 +4829,7 @@
             <a:pPr algn="l"/>
             <a:r>
               <a:rPr lang="en-US" sz="3600"/>
-              <a:t>category_name_03.txt</a:t>
+              <a:t>Category: Category 3.txt</a:t>
             </a:r>
             <a:endParaRPr lang="en-US" sz="1100"/>
           </a:p>
@@ -4857,7 +4857,7 @@
             <a:pPr algn="l"/>
             <a:r>
               <a:rPr lang="en-US" sz="4400"/>
-              <a:t>Question 3 of 10 in round 10</a:t>
+              <a:t>Question 3 of 10 in round 9</a:t>
             </a:r>
             <a:endParaRPr lang="en-US" sz="1100"/>
           </a:p>
@@ -4910,7 +4910,7 @@
             <a:pPr algn="l"/>
             <a:r>
               <a:rPr lang="en-US" sz="3600"/>
-              <a:t>category_name_04.txt</a:t>
+              <a:t>Category: Category 3.txt</a:t>
             </a:r>
             <a:endParaRPr lang="en-US" sz="1100"/>
           </a:p>
@@ -4938,7 +4938,7 @@
             <a:pPr algn="l"/>
             <a:r>
               <a:rPr lang="en-US" sz="4400"/>
-              <a:t>Question 4 of 10 in round 10</a:t>
+              <a:t>Question 4 of 10 in round 9</a:t>
             </a:r>
             <a:endParaRPr lang="en-US" sz="1100"/>
           </a:p>
@@ -4991,7 +4991,7 @@
             <a:pPr algn="l"/>
             <a:r>
               <a:rPr lang="en-US" sz="3600"/>
-              <a:t>category_name_05.txt</a:t>
+              <a:t>Category: Category 3.txt</a:t>
             </a:r>
             <a:endParaRPr lang="en-US" sz="1100"/>
           </a:p>
@@ -5019,7 +5019,7 @@
             <a:pPr algn="l"/>
             <a:r>
               <a:rPr lang="en-US" sz="4400"/>
-              <a:t>Question 5 of 10 in round 10</a:t>
+              <a:t>Question 5 of 10 in round 9</a:t>
             </a:r>
             <a:endParaRPr lang="en-US" sz="1100"/>
           </a:p>
@@ -5072,7 +5072,7 @@
             <a:pPr algn="l"/>
             <a:r>
               <a:rPr lang="en-US" sz="3600"/>
-              <a:t>category_name_06.txt</a:t>
+              <a:t>Category: Category 3.txt</a:t>
             </a:r>
             <a:endParaRPr lang="en-US" sz="1100"/>
           </a:p>
@@ -5100,7 +5100,7 @@
             <a:pPr algn="l"/>
             <a:r>
               <a:rPr lang="en-US" sz="4400"/>
-              <a:t>Question 6 of 10 in round 10</a:t>
+              <a:t>Question 6 of 10 in round 9</a:t>
             </a:r>
             <a:endParaRPr lang="en-US" sz="1100"/>
           </a:p>
@@ -5153,7 +5153,7 @@
             <a:pPr algn="l"/>
             <a:r>
               <a:rPr lang="en-US" sz="3600"/>
-              <a:t>category_name_07.txt</a:t>
+              <a:t>Category: Category 3.txt</a:t>
             </a:r>
             <a:endParaRPr lang="en-US" sz="1100"/>
           </a:p>
@@ -5181,7 +5181,7 @@
             <a:pPr algn="l"/>
             <a:r>
               <a:rPr lang="en-US" sz="4400"/>
-              <a:t>Question 7 of 10 in round 10</a:t>
+              <a:t>Question 7 of 10 in round 9</a:t>
             </a:r>
             <a:endParaRPr lang="en-US" sz="1100"/>
           </a:p>
@@ -5234,7 +5234,7 @@
             <a:pPr algn="l"/>
             <a:r>
               <a:rPr lang="en-US" sz="3600"/>
-              <a:t>category_name_08.txt</a:t>
+              <a:t>Category: Category 3.txt</a:t>
             </a:r>
             <a:endParaRPr lang="en-US" sz="1100"/>
           </a:p>
@@ -5262,7 +5262,7 @@
             <a:pPr algn="l"/>
             <a:r>
               <a:rPr lang="en-US" sz="4400"/>
-              <a:t>Question 8 of 10 in round 10</a:t>
+              <a:t>Question 8 of 10 in round 9</a:t>
             </a:r>
             <a:endParaRPr lang="en-US" sz="1100"/>
           </a:p>
@@ -5315,7 +5315,7 @@
             <a:pPr algn="l"/>
             <a:r>
               <a:rPr lang="en-US" sz="3600"/>
-              <a:t>category_name_09.txt</a:t>
+              <a:t>Category: Category 3.txt</a:t>
             </a:r>
             <a:endParaRPr lang="en-US" sz="1100"/>
           </a:p>
@@ -5343,7 +5343,7 @@
             <a:pPr algn="l"/>
             <a:r>
               <a:rPr lang="en-US" sz="4400"/>
-              <a:t>Question 9 of 10 in round 10</a:t>
+              <a:t>Question 9 of 10 in round 9</a:t>
             </a:r>
             <a:endParaRPr lang="en-US" sz="1100"/>
           </a:p>
@@ -5396,7 +5396,7 @@
             <a:pPr algn="l"/>
             <a:r>
               <a:rPr lang="en-US" sz="3600"/>
-              <a:t>category_name_10.txt</a:t>
+              <a:t>Category: Category 3.txt</a:t>
             </a:r>
             <a:endParaRPr lang="en-US" sz="1100"/>
           </a:p>
@@ -5424,7 +5424,7 @@
             <a:pPr algn="l"/>
             <a:r>
               <a:rPr lang="en-US" sz="4400"/>
-              <a:t>Question 10 of 10 in round 10</a:t>
+              <a:t>Question 10 of 10 in round 9</a:t>
             </a:r>
             <a:endParaRPr lang="en-US" sz="1100"/>
           </a:p>
@@ -5782,7 +5782,7 @@
             <a:pPr algn="l"/>
             <a:r>
               <a:rPr lang="en-US" sz="3600"/>
-              <a:t>Answer 1 of 10 in round 10</a:t>
+              <a:t>Answer 1 of 10 in round 9</a:t>
             </a:r>
             <a:endParaRPr lang="en-US" sz="1100"/>
           </a:p>
@@ -5810,7 +5810,7 @@
             <a:pPr algn="l"/>
             <a:r>
               <a:rPr lang="en-US" sz="3600"/>
-              <a:t>Answer 2 of 10 in round 10</a:t>
+              <a:t>Answer 2 of 10 in round 9</a:t>
             </a:r>
             <a:endParaRPr lang="en-US" sz="1100"/>
           </a:p>
@@ -5838,7 +5838,7 @@
             <a:pPr algn="l"/>
             <a:r>
               <a:rPr lang="en-US" sz="3600"/>
-              <a:t>Answer 3 of 10 in round 10</a:t>
+              <a:t>Answer 3 of 10 in round 9</a:t>
             </a:r>
             <a:endParaRPr lang="en-US" sz="1100"/>
           </a:p>
@@ -5866,7 +5866,7 @@
             <a:pPr algn="l"/>
             <a:r>
               <a:rPr lang="en-US" sz="3600"/>
-              <a:t>Answer 4 of 10 in round 10</a:t>
+              <a:t>Answer 4 of 10 in round 9</a:t>
             </a:r>
             <a:endParaRPr lang="en-US" sz="1100"/>
           </a:p>
@@ -5894,7 +5894,7 @@
             <a:pPr algn="l"/>
             <a:r>
               <a:rPr lang="en-US" sz="3600"/>
-              <a:t>Answer 5 of 10 in round 10</a:t>
+              <a:t>Answer 5 of 10 in round 9</a:t>
             </a:r>
             <a:endParaRPr lang="en-US" sz="1100"/>
           </a:p>
@@ -5922,7 +5922,7 @@
             <a:pPr algn="l"/>
             <a:r>
               <a:rPr lang="en-US" sz="3600"/>
-              <a:t>Answer 6 of 10 in round 10</a:t>
+              <a:t>Answer 6 of 10 in round 9</a:t>
             </a:r>
             <a:endParaRPr lang="en-US" sz="1100"/>
           </a:p>
@@ -5950,7 +5950,7 @@
             <a:pPr algn="l"/>
             <a:r>
               <a:rPr lang="en-US" sz="3600"/>
-              <a:t>Answer 7 of 10 in round 10</a:t>
+              <a:t>Answer 7 of 10 in round 9</a:t>
             </a:r>
             <a:endParaRPr lang="en-US" sz="1100"/>
           </a:p>
@@ -5978,7 +5978,7 @@
             <a:pPr algn="l"/>
             <a:r>
               <a:rPr lang="en-US" sz="3600"/>
-              <a:t>Answer 8 of 10 in round 10</a:t>
+              <a:t>Answer 8 of 10 in round 9</a:t>
             </a:r>
             <a:endParaRPr lang="en-US" sz="1100"/>
           </a:p>
@@ -6006,7 +6006,7 @@
             <a:pPr algn="l"/>
             <a:r>
               <a:rPr lang="en-US" sz="3600"/>
-              <a:t>Answer 9 of 10 in round 10</a:t>
+              <a:t>Answer 9 of 10 in round 9</a:t>
             </a:r>
             <a:endParaRPr lang="en-US" sz="1100"/>
           </a:p>
@@ -6034,7 +6034,7 @@
             <a:pPr algn="l"/>
             <a:r>
               <a:rPr lang="en-US" sz="3600"/>
-              <a:t>Answer 10 of 10 in round 10</a:t>
+              <a:t>Answer 10 of 10 in round 9</a:t>
             </a:r>
             <a:endParaRPr lang="en-US" sz="1100"/>
           </a:p>
@@ -6263,7 +6263,7 @@
             <a:pPr algn="l"/>
             <a:r>
               <a:rPr lang="en-US" sz="3600"/>
-              <a:t>category_name_01.txt</a:t>
+              <a:t>Category: Category 2.txt</a:t>
             </a:r>
             <a:endParaRPr lang="en-US" sz="1100"/>
           </a:p>
@@ -6291,7 +6291,7 @@
             <a:pPr algn="l"/>
             <a:r>
               <a:rPr lang="en-US" sz="4400"/>
-              <a:t>Question 1 of 10 in round 2</a:t>
+              <a:t>Question 1 of 10 in round 10</a:t>
             </a:r>
             <a:endParaRPr lang="en-US" sz="1100"/>
           </a:p>
@@ -6344,7 +6344,7 @@
             <a:pPr algn="l"/>
             <a:r>
               <a:rPr lang="en-US" sz="3600"/>
-              <a:t>category_name_02.txt</a:t>
+              <a:t>Category: Category 2.txt</a:t>
             </a:r>
             <a:endParaRPr lang="en-US" sz="1100"/>
           </a:p>
@@ -6372,7 +6372,7 @@
             <a:pPr algn="l"/>
             <a:r>
               <a:rPr lang="en-US" sz="4400"/>
-              <a:t>Question 2 of 10 in round 2</a:t>
+              <a:t>Question 2 of 10 in round 10</a:t>
             </a:r>
             <a:endParaRPr lang="en-US" sz="1100"/>
           </a:p>
@@ -6425,7 +6425,7 @@
             <a:pPr algn="l"/>
             <a:r>
               <a:rPr lang="en-US" sz="3600"/>
-              <a:t>category_name_03.txt</a:t>
+              <a:t>Category: Category 2.txt</a:t>
             </a:r>
             <a:endParaRPr lang="en-US" sz="1100"/>
           </a:p>
@@ -6453,7 +6453,7 @@
             <a:pPr algn="l"/>
             <a:r>
               <a:rPr lang="en-US" sz="4400"/>
-              <a:t>Question 3 of 10 in round 2</a:t>
+              <a:t>Question 3 of 10 in round 10</a:t>
             </a:r>
             <a:endParaRPr lang="en-US" sz="1100"/>
           </a:p>
@@ -6506,7 +6506,7 @@
             <a:pPr algn="l"/>
             <a:r>
               <a:rPr lang="en-US" sz="3600"/>
-              <a:t>category_name_04.txt</a:t>
+              <a:t>Category: Category 2.txt</a:t>
             </a:r>
             <a:endParaRPr lang="en-US" sz="1100"/>
           </a:p>
@@ -6534,7 +6534,7 @@
             <a:pPr algn="l"/>
             <a:r>
               <a:rPr lang="en-US" sz="4400"/>
-              <a:t>Question 4 of 10 in round 2</a:t>
+              <a:t>Question 4 of 10 in round 10</a:t>
             </a:r>
             <a:endParaRPr lang="en-US" sz="1100"/>
           </a:p>
@@ -6587,7 +6587,7 @@
             <a:pPr algn="l"/>
             <a:r>
               <a:rPr lang="en-US" sz="3600"/>
-              <a:t>category_name_05.txt</a:t>
+              <a:t>Category: Category 2.txt</a:t>
             </a:r>
             <a:endParaRPr lang="en-US" sz="1100"/>
           </a:p>
@@ -6615,7 +6615,7 @@
             <a:pPr algn="l"/>
             <a:r>
               <a:rPr lang="en-US" sz="4400"/>
-              <a:t>Question 5 of 10 in round 2</a:t>
+              <a:t>Question 5 of 10 in round 10</a:t>
             </a:r>
             <a:endParaRPr lang="en-US" sz="1100"/>
           </a:p>
@@ -6668,7 +6668,7 @@
             <a:pPr algn="l"/>
             <a:r>
               <a:rPr lang="en-US" sz="3600"/>
-              <a:t>category_name_06.txt</a:t>
+              <a:t>Category: Category 2.txt</a:t>
             </a:r>
             <a:endParaRPr lang="en-US" sz="1100"/>
           </a:p>
@@ -6696,7 +6696,7 @@
             <a:pPr algn="l"/>
             <a:r>
               <a:rPr lang="en-US" sz="4400"/>
-              <a:t>Question 6 of 10 in round 2</a:t>
+              <a:t>Question 6 of 10 in round 10</a:t>
             </a:r>
             <a:endParaRPr lang="en-US" sz="1100"/>
           </a:p>
@@ -6749,7 +6749,7 @@
             <a:pPr algn="l"/>
             <a:r>
               <a:rPr lang="en-US" sz="3600"/>
-              <a:t>category_name_01.txt</a:t>
+              <a:t>Category: Category 1.txt</a:t>
             </a:r>
             <a:endParaRPr lang="en-US" sz="1100"/>
           </a:p>
@@ -6830,7 +6830,7 @@
             <a:pPr algn="l"/>
             <a:r>
               <a:rPr lang="en-US" sz="3600"/>
-              <a:t>category_name_07.txt</a:t>
+              <a:t>Category: Category 2.txt</a:t>
             </a:r>
             <a:endParaRPr lang="en-US" sz="1100"/>
           </a:p>
@@ -6858,7 +6858,7 @@
             <a:pPr algn="l"/>
             <a:r>
               <a:rPr lang="en-US" sz="4400"/>
-              <a:t>Question 7 of 10 in round 2</a:t>
+              <a:t>Question 7 of 10 in round 10</a:t>
             </a:r>
             <a:endParaRPr lang="en-US" sz="1100"/>
           </a:p>
@@ -6911,7 +6911,7 @@
             <a:pPr algn="l"/>
             <a:r>
               <a:rPr lang="en-US" sz="3600"/>
-              <a:t>category_name_08.txt</a:t>
+              <a:t>Category: Category 2.txt</a:t>
             </a:r>
             <a:endParaRPr lang="en-US" sz="1100"/>
           </a:p>
@@ -6939,7 +6939,7 @@
             <a:pPr algn="l"/>
             <a:r>
               <a:rPr lang="en-US" sz="4400"/>
-              <a:t>Question 8 of 10 in round 2</a:t>
+              <a:t>Question 8 of 10 in round 10</a:t>
             </a:r>
             <a:endParaRPr lang="en-US" sz="1100"/>
           </a:p>
@@ -6992,7 +6992,7 @@
             <a:pPr algn="l"/>
             <a:r>
               <a:rPr lang="en-US" sz="3600"/>
-              <a:t>category_name_09.txt</a:t>
+              <a:t>Category: Category 2.txt</a:t>
             </a:r>
             <a:endParaRPr lang="en-US" sz="1100"/>
           </a:p>
@@ -7020,7 +7020,7 @@
             <a:pPr algn="l"/>
             <a:r>
               <a:rPr lang="en-US" sz="4400"/>
-              <a:t>Question 9 of 10 in round 2</a:t>
+              <a:t>Question 9 of 10 in round 10</a:t>
             </a:r>
             <a:endParaRPr lang="en-US" sz="1100"/>
           </a:p>
@@ -7073,7 +7073,7 @@
             <a:pPr algn="l"/>
             <a:r>
               <a:rPr lang="en-US" sz="3600"/>
-              <a:t>category_name_10.txt</a:t>
+              <a:t>Category: Category 2.txt</a:t>
             </a:r>
             <a:endParaRPr lang="en-US" sz="1100"/>
           </a:p>
@@ -7101,7 +7101,7 @@
             <a:pPr algn="l"/>
             <a:r>
               <a:rPr lang="en-US" sz="4400"/>
-              <a:t>Question 10 of 10 in round 2</a:t>
+              <a:t>Question 10 of 10 in round 10</a:t>
             </a:r>
             <a:endParaRPr lang="en-US" sz="1100"/>
           </a:p>
@@ -7154,7 +7154,7 @@
             <a:pPr algn="l"/>
             <a:r>
               <a:rPr lang="en-US" sz="3600"/>
-              <a:t>Answer 1 of 10 in round 2</a:t>
+              <a:t>Answer 1 of 10 in round 10</a:t>
             </a:r>
             <a:endParaRPr lang="en-US" sz="1100"/>
           </a:p>
@@ -7182,7 +7182,7 @@
             <a:pPr algn="l"/>
             <a:r>
               <a:rPr lang="en-US" sz="3600"/>
-              <a:t>Answer 2 of 10 in round 2</a:t>
+              <a:t>Answer 2 of 10 in round 10</a:t>
             </a:r>
             <a:endParaRPr lang="en-US" sz="1100"/>
           </a:p>
@@ -7210,7 +7210,7 @@
             <a:pPr algn="l"/>
             <a:r>
               <a:rPr lang="en-US" sz="3600"/>
-              <a:t>Answer 3 of 10 in round 2</a:t>
+              <a:t>Answer 3 of 10 in round 10</a:t>
             </a:r>
             <a:endParaRPr lang="en-US" sz="1100"/>
           </a:p>
@@ -7238,7 +7238,7 @@
             <a:pPr algn="l"/>
             <a:r>
               <a:rPr lang="en-US" sz="3600"/>
-              <a:t>Answer 4 of 10 in round 2</a:t>
+              <a:t>Answer 4 of 10 in round 10</a:t>
             </a:r>
             <a:endParaRPr lang="en-US" sz="1100"/>
           </a:p>
@@ -7266,7 +7266,7 @@
             <a:pPr algn="l"/>
             <a:r>
               <a:rPr lang="en-US" sz="3600"/>
-              <a:t>Answer 5 of 10 in round 2</a:t>
+              <a:t>Answer 5 of 10 in round 10</a:t>
             </a:r>
             <a:endParaRPr lang="en-US" sz="1100"/>
           </a:p>
@@ -7294,7 +7294,7 @@
             <a:pPr algn="l"/>
             <a:r>
               <a:rPr lang="en-US" sz="3600"/>
-              <a:t>Answer 6 of 10 in round 2</a:t>
+              <a:t>Answer 6 of 10 in round 10</a:t>
             </a:r>
             <a:endParaRPr lang="en-US" sz="1100"/>
           </a:p>
@@ -7322,7 +7322,7 @@
             <a:pPr algn="l"/>
             <a:r>
               <a:rPr lang="en-US" sz="3600"/>
-              <a:t>Answer 7 of 10 in round 2</a:t>
+              <a:t>Answer 7 of 10 in round 10</a:t>
             </a:r>
             <a:endParaRPr lang="en-US" sz="1100"/>
           </a:p>
@@ -7350,7 +7350,7 @@
             <a:pPr algn="l"/>
             <a:r>
               <a:rPr lang="en-US" sz="3600"/>
-              <a:t>Answer 8 of 10 in round 2</a:t>
+              <a:t>Answer 8 of 10 in round 10</a:t>
             </a:r>
             <a:endParaRPr lang="en-US" sz="1100"/>
           </a:p>
@@ -7378,7 +7378,7 @@
             <a:pPr algn="l"/>
             <a:r>
               <a:rPr lang="en-US" sz="3600"/>
-              <a:t>Answer 9 of 10 in round 2</a:t>
+              <a:t>Answer 9 of 10 in round 10</a:t>
             </a:r>
             <a:endParaRPr lang="en-US" sz="1100"/>
           </a:p>
@@ -7406,7 +7406,7 @@
             <a:pPr algn="l"/>
             <a:r>
               <a:rPr lang="en-US" sz="3600"/>
-              <a:t>Answer 10 of 10 in round 2</a:t>
+              <a:t>Answer 10 of 10 in round 10</a:t>
             </a:r>
             <a:endParaRPr lang="en-US" sz="1100"/>
           </a:p>
@@ -7635,7 +7635,7 @@
             <a:pPr algn="l"/>
             <a:r>
               <a:rPr lang="en-US" sz="3600"/>
-              <a:t>category_name_01.txt</a:t>
+              <a:t>Category: Category 4.txt</a:t>
             </a:r>
             <a:endParaRPr lang="en-US" sz="1100"/>
           </a:p>
@@ -7663,7 +7663,7 @@
             <a:pPr algn="l"/>
             <a:r>
               <a:rPr lang="en-US" sz="4400"/>
-              <a:t>Question 1 of 10 in round 3</a:t>
+              <a:t>Question 1 of 10 in round 2</a:t>
             </a:r>
             <a:endParaRPr lang="en-US" sz="1100"/>
           </a:p>
@@ -7716,7 +7716,7 @@
             <a:pPr algn="l"/>
             <a:r>
               <a:rPr lang="en-US" sz="3600"/>
-              <a:t>category_name_02.txt</a:t>
+              <a:t>Category: Category 4.txt</a:t>
             </a:r>
             <a:endParaRPr lang="en-US" sz="1100"/>
           </a:p>
@@ -7744,7 +7744,7 @@
             <a:pPr algn="l"/>
             <a:r>
               <a:rPr lang="en-US" sz="4400"/>
-              <a:t>Question 2 of 10 in round 3</a:t>
+              <a:t>Question 2 of 10 in round 2</a:t>
             </a:r>
             <a:endParaRPr lang="en-US" sz="1100"/>
           </a:p>
@@ -7797,7 +7797,7 @@
             <a:pPr algn="l"/>
             <a:r>
               <a:rPr lang="en-US" sz="3600"/>
-              <a:t>category_name_03.txt</a:t>
+              <a:t>Category: Category 4.txt</a:t>
             </a:r>
             <a:endParaRPr lang="en-US" sz="1100"/>
           </a:p>
@@ -7825,7 +7825,7 @@
             <a:pPr algn="l"/>
             <a:r>
               <a:rPr lang="en-US" sz="4400"/>
-              <a:t>Question 3 of 10 in round 3</a:t>
+              <a:t>Question 3 of 10 in round 2</a:t>
             </a:r>
             <a:endParaRPr lang="en-US" sz="1100"/>
           </a:p>
@@ -7878,7 +7878,7 @@
             <a:pPr algn="l"/>
             <a:r>
               <a:rPr lang="en-US" sz="3600"/>
-              <a:t>category_name_04.txt</a:t>
+              <a:t>Category: Category 4.txt</a:t>
             </a:r>
             <a:endParaRPr lang="en-US" sz="1100"/>
           </a:p>
@@ -7906,7 +7906,7 @@
             <a:pPr algn="l"/>
             <a:r>
               <a:rPr lang="en-US" sz="4400"/>
-              <a:t>Question 4 of 10 in round 3</a:t>
+              <a:t>Question 4 of 10 in round 2</a:t>
             </a:r>
             <a:endParaRPr lang="en-US" sz="1100"/>
           </a:p>
@@ -7959,7 +7959,7 @@
             <a:pPr algn="l"/>
             <a:r>
               <a:rPr lang="en-US" sz="3600"/>
-              <a:t>category_name_02.txt</a:t>
+              <a:t>Category: Category 1.txt</a:t>
             </a:r>
             <a:endParaRPr lang="en-US" sz="1100"/>
           </a:p>
@@ -8040,7 +8040,7 @@
             <a:pPr algn="l"/>
             <a:r>
               <a:rPr lang="en-US" sz="3600"/>
-              <a:t>category_name_05.txt</a:t>
+              <a:t>Category: Category 4.txt</a:t>
             </a:r>
             <a:endParaRPr lang="en-US" sz="1100"/>
           </a:p>
@@ -8068,7 +8068,7 @@
             <a:pPr algn="l"/>
             <a:r>
               <a:rPr lang="en-US" sz="4400"/>
-              <a:t>Question 5 of 10 in round 3</a:t>
+              <a:t>Question 5 of 10 in round 2</a:t>
             </a:r>
             <a:endParaRPr lang="en-US" sz="1100"/>
           </a:p>
@@ -8121,7 +8121,7 @@
             <a:pPr algn="l"/>
             <a:r>
               <a:rPr lang="en-US" sz="3600"/>
-              <a:t>category_name_06.txt</a:t>
+              <a:t>Category: Category 4.txt</a:t>
             </a:r>
             <a:endParaRPr lang="en-US" sz="1100"/>
           </a:p>
@@ -8149,7 +8149,7 @@
             <a:pPr algn="l"/>
             <a:r>
               <a:rPr lang="en-US" sz="4400"/>
-              <a:t>Question 6 of 10 in round 3</a:t>
+              <a:t>Question 6 of 10 in round 2</a:t>
             </a:r>
             <a:endParaRPr lang="en-US" sz="1100"/>
           </a:p>
@@ -8202,7 +8202,7 @@
             <a:pPr algn="l"/>
             <a:r>
               <a:rPr lang="en-US" sz="3600"/>
-              <a:t>category_name_07.txt</a:t>
+              <a:t>Category: Category 4.txt</a:t>
             </a:r>
             <a:endParaRPr lang="en-US" sz="1100"/>
           </a:p>
@@ -8230,7 +8230,7 @@
             <a:pPr algn="l"/>
             <a:r>
               <a:rPr lang="en-US" sz="4400"/>
-              <a:t>Question 7 of 10 in round 3</a:t>
+              <a:t>Question 7 of 10 in round 2</a:t>
             </a:r>
             <a:endParaRPr lang="en-US" sz="1100"/>
           </a:p>
@@ -8283,7 +8283,7 @@
             <a:pPr algn="l"/>
             <a:r>
               <a:rPr lang="en-US" sz="3600"/>
-              <a:t>category_name_08.txt</a:t>
+              <a:t>Category: Category 4.txt</a:t>
             </a:r>
             <a:endParaRPr lang="en-US" sz="1100"/>
           </a:p>
@@ -8311,7 +8311,7 @@
             <a:pPr algn="l"/>
             <a:r>
               <a:rPr lang="en-US" sz="4400"/>
-              <a:t>Question 8 of 10 in round 3</a:t>
+              <a:t>Question 8 of 10 in round 2</a:t>
             </a:r>
             <a:endParaRPr lang="en-US" sz="1100"/>
           </a:p>
@@ -8364,7 +8364,7 @@
             <a:pPr algn="l"/>
             <a:r>
               <a:rPr lang="en-US" sz="3600"/>
-              <a:t>category_name_09.txt</a:t>
+              <a:t>Category: Category 4.txt</a:t>
             </a:r>
             <a:endParaRPr lang="en-US" sz="1100"/>
           </a:p>
@@ -8392,7 +8392,7 @@
             <a:pPr algn="l"/>
             <a:r>
               <a:rPr lang="en-US" sz="4400"/>
-              <a:t>Question 9 of 10 in round 3</a:t>
+              <a:t>Question 9 of 10 in round 2</a:t>
             </a:r>
             <a:endParaRPr lang="en-US" sz="1100"/>
           </a:p>
@@ -8445,7 +8445,7 @@
             <a:pPr algn="l"/>
             <a:r>
               <a:rPr lang="en-US" sz="3600"/>
-              <a:t>category_name_10.txt</a:t>
+              <a:t>Category: Category 4.txt</a:t>
             </a:r>
             <a:endParaRPr lang="en-US" sz="1100"/>
           </a:p>
@@ -8473,7 +8473,7 @@
             <a:pPr algn="l"/>
             <a:r>
               <a:rPr lang="en-US" sz="4400"/>
-              <a:t>Question 10 of 10 in round 3</a:t>
+              <a:t>Question 10 of 10 in round 2</a:t>
             </a:r>
             <a:endParaRPr lang="en-US" sz="1100"/>
           </a:p>
@@ -8526,7 +8526,7 @@
             <a:pPr algn="l"/>
             <a:r>
               <a:rPr lang="en-US" sz="3600"/>
-              <a:t>Answer 1 of 10 in round 3</a:t>
+              <a:t>Answer 1 of 10 in round 2</a:t>
             </a:r>
             <a:endParaRPr lang="en-US" sz="1100"/>
           </a:p>
@@ -8554,7 +8554,7 @@
             <a:pPr algn="l"/>
             <a:r>
               <a:rPr lang="en-US" sz="3600"/>
-              <a:t>Answer 2 of 10 in round 3</a:t>
+              <a:t>Answer 2 of 10 in round 2</a:t>
             </a:r>
             <a:endParaRPr lang="en-US" sz="1100"/>
           </a:p>
@@ -8582,7 +8582,7 @@
             <a:pPr algn="l"/>
             <a:r>
               <a:rPr lang="en-US" sz="3600"/>
-              <a:t>Answer 3 of 10 in round 3</a:t>
+              <a:t>Answer 3 of 10 in round 2</a:t>
             </a:r>
             <a:endParaRPr lang="en-US" sz="1100"/>
           </a:p>
@@ -8610,7 +8610,7 @@
             <a:pPr algn="l"/>
             <a:r>
               <a:rPr lang="en-US" sz="3600"/>
-              <a:t>Answer 4 of 10 in round 3</a:t>
+              <a:t>Answer 4 of 10 in round 2</a:t>
             </a:r>
             <a:endParaRPr lang="en-US" sz="1100"/>
           </a:p>
@@ -8638,7 +8638,7 @@
             <a:pPr algn="l"/>
             <a:r>
               <a:rPr lang="en-US" sz="3600"/>
-              <a:t>Answer 5 of 10 in round 3</a:t>
+              <a:t>Answer 5 of 10 in round 2</a:t>
             </a:r>
             <a:endParaRPr lang="en-US" sz="1100"/>
           </a:p>
@@ -8666,7 +8666,7 @@
             <a:pPr algn="l"/>
             <a:r>
               <a:rPr lang="en-US" sz="3600"/>
-              <a:t>Answer 6 of 10 in round 3</a:t>
+              <a:t>Answer 6 of 10 in round 2</a:t>
             </a:r>
             <a:endParaRPr lang="en-US" sz="1100"/>
           </a:p>
@@ -8694,7 +8694,7 @@
             <a:pPr algn="l"/>
             <a:r>
               <a:rPr lang="en-US" sz="3600"/>
-              <a:t>Answer 7 of 10 in round 3</a:t>
+              <a:t>Answer 7 of 10 in round 2</a:t>
             </a:r>
             <a:endParaRPr lang="en-US" sz="1100"/>
           </a:p>
@@ -8722,7 +8722,7 @@
             <a:pPr algn="l"/>
             <a:r>
               <a:rPr lang="en-US" sz="3600"/>
-              <a:t>Answer 8 of 10 in round 3</a:t>
+              <a:t>Answer 8 of 10 in round 2</a:t>
             </a:r>
             <a:endParaRPr lang="en-US" sz="1100"/>
           </a:p>
@@ -8750,7 +8750,7 @@
             <a:pPr algn="l"/>
             <a:r>
               <a:rPr lang="en-US" sz="3600"/>
-              <a:t>Answer 9 of 10 in round 3</a:t>
+              <a:t>Answer 9 of 10 in round 2</a:t>
             </a:r>
             <a:endParaRPr lang="en-US" sz="1100"/>
           </a:p>
@@ -8778,7 +8778,7 @@
             <a:pPr algn="l"/>
             <a:r>
               <a:rPr lang="en-US" sz="3600"/>
-              <a:t>Answer 10 of 10 in round 3</a:t>
+              <a:t>Answer 10 of 10 in round 2</a:t>
             </a:r>
             <a:endParaRPr lang="en-US" sz="1100"/>
           </a:p>
@@ -9007,7 +9007,7 @@
             <a:pPr algn="l"/>
             <a:r>
               <a:rPr lang="en-US" sz="3600"/>
-              <a:t>category_name_01.txt</a:t>
+              <a:t>Category: Category 6.txt</a:t>
             </a:r>
             <a:endParaRPr lang="en-US" sz="1100"/>
           </a:p>
@@ -9035,7 +9035,7 @@
             <a:pPr algn="l"/>
             <a:r>
               <a:rPr lang="en-US" sz="4400"/>
-              <a:t>Question 1 of 10 in round 4</a:t>
+              <a:t>Question 1 of 10 in round 3</a:t>
             </a:r>
             <a:endParaRPr lang="en-US" sz="1100"/>
           </a:p>
@@ -9088,7 +9088,7 @@
             <a:pPr algn="l"/>
             <a:r>
               <a:rPr lang="en-US" sz="3600"/>
-              <a:t>category_name_02.txt</a:t>
+              <a:t>Category: Category 6.txt</a:t>
             </a:r>
             <a:endParaRPr lang="en-US" sz="1100"/>
           </a:p>
@@ -9116,7 +9116,7 @@
             <a:pPr algn="l"/>
             <a:r>
               <a:rPr lang="en-US" sz="4400"/>
-              <a:t>Question 2 of 10 in round 4</a:t>
+              <a:t>Question 2 of 10 in round 3</a:t>
             </a:r>
             <a:endParaRPr lang="en-US" sz="1100"/>
           </a:p>
@@ -9169,7 +9169,7 @@
             <a:pPr algn="l"/>
             <a:r>
               <a:rPr lang="en-US" sz="3600"/>
-              <a:t>category_name_03.txt</a:t>
+              <a:t>Category: Category 1.txt</a:t>
             </a:r>
             <a:endParaRPr lang="en-US" sz="1100"/>
           </a:p>
@@ -9250,7 +9250,7 @@
             <a:pPr algn="l"/>
             <a:r>
               <a:rPr lang="en-US" sz="3600"/>
-              <a:t>category_name_03.txt</a:t>
+              <a:t>Category: Category 6.txt</a:t>
             </a:r>
             <a:endParaRPr lang="en-US" sz="1100"/>
           </a:p>
@@ -9278,7 +9278,7 @@
             <a:pPr algn="l"/>
             <a:r>
               <a:rPr lang="en-US" sz="4400"/>
-              <a:t>Question 3 of 10 in round 4</a:t>
+              <a:t>Question 3 of 10 in round 3</a:t>
             </a:r>
             <a:endParaRPr lang="en-US" sz="1100"/>
           </a:p>
@@ -9331,7 +9331,7 @@
             <a:pPr algn="l"/>
             <a:r>
               <a:rPr lang="en-US" sz="3600"/>
-              <a:t>category_name_04.txt</a:t>
+              <a:t>Category: Category 6.txt</a:t>
             </a:r>
             <a:endParaRPr lang="en-US" sz="1100"/>
           </a:p>
@@ -9359,7 +9359,7 @@
             <a:pPr algn="l"/>
             <a:r>
               <a:rPr lang="en-US" sz="4400"/>
-              <a:t>Question 4 of 10 in round 4</a:t>
+              <a:t>Question 4 of 10 in round 3</a:t>
             </a:r>
             <a:endParaRPr lang="en-US" sz="1100"/>
           </a:p>
@@ -9412,7 +9412,7 @@
             <a:pPr algn="l"/>
             <a:r>
               <a:rPr lang="en-US" sz="3600"/>
-              <a:t>category_name_05.txt</a:t>
+              <a:t>Category: Category 6.txt</a:t>
             </a:r>
             <a:endParaRPr lang="en-US" sz="1100"/>
           </a:p>
@@ -9440,7 +9440,7 @@
             <a:pPr algn="l"/>
             <a:r>
               <a:rPr lang="en-US" sz="4400"/>
-              <a:t>Question 5 of 10 in round 4</a:t>
+              <a:t>Question 5 of 10 in round 3</a:t>
             </a:r>
             <a:endParaRPr lang="en-US" sz="1100"/>
           </a:p>
@@ -9493,7 +9493,7 @@
             <a:pPr algn="l"/>
             <a:r>
               <a:rPr lang="en-US" sz="3600"/>
-              <a:t>category_name_06.txt</a:t>
+              <a:t>Category: Category 6.txt</a:t>
             </a:r>
             <a:endParaRPr lang="en-US" sz="1100"/>
           </a:p>
@@ -9521,7 +9521,7 @@
             <a:pPr algn="l"/>
             <a:r>
               <a:rPr lang="en-US" sz="4400"/>
-              <a:t>Question 6 of 10 in round 4</a:t>
+              <a:t>Question 6 of 10 in round 3</a:t>
             </a:r>
             <a:endParaRPr lang="en-US" sz="1100"/>
           </a:p>
@@ -9574,7 +9574,7 @@
             <a:pPr algn="l"/>
             <a:r>
               <a:rPr lang="en-US" sz="3600"/>
-              <a:t>category_name_07.txt</a:t>
+              <a:t>Category: Category 6.txt</a:t>
             </a:r>
             <a:endParaRPr lang="en-US" sz="1100"/>
           </a:p>
@@ -9602,7 +9602,7 @@
             <a:pPr algn="l"/>
             <a:r>
               <a:rPr lang="en-US" sz="4400"/>
-              <a:t>Question 7 of 10 in round 4</a:t>
+              <a:t>Question 7 of 10 in round 3</a:t>
             </a:r>
             <a:endParaRPr lang="en-US" sz="1100"/>
           </a:p>
@@ -9655,7 +9655,7 @@
             <a:pPr algn="l"/>
             <a:r>
               <a:rPr lang="en-US" sz="3600"/>
-              <a:t>category_name_08.txt</a:t>
+              <a:t>Category: Category 6.txt</a:t>
             </a:r>
             <a:endParaRPr lang="en-US" sz="1100"/>
           </a:p>
@@ -9683,7 +9683,7 @@
             <a:pPr algn="l"/>
             <a:r>
               <a:rPr lang="en-US" sz="4400"/>
-              <a:t>Question 8 of 10 in round 4</a:t>
+              <a:t>Question 8 of 10 in round 3</a:t>
             </a:r>
             <a:endParaRPr lang="en-US" sz="1100"/>
           </a:p>
@@ -9736,7 +9736,7 @@
             <a:pPr algn="l"/>
             <a:r>
               <a:rPr lang="en-US" sz="3600"/>
-              <a:t>category_name_09.txt</a:t>
+              <a:t>Category: Category 6.txt</a:t>
             </a:r>
             <a:endParaRPr lang="en-US" sz="1100"/>
           </a:p>
@@ -9764,7 +9764,7 @@
             <a:pPr algn="l"/>
             <a:r>
               <a:rPr lang="en-US" sz="4400"/>
-              <a:t>Question 9 of 10 in round 4</a:t>
+              <a:t>Question 9 of 10 in round 3</a:t>
             </a:r>
             <a:endParaRPr lang="en-US" sz="1100"/>
           </a:p>
@@ -9817,7 +9817,7 @@
             <a:pPr algn="l"/>
             <a:r>
               <a:rPr lang="en-US" sz="3600"/>
-              <a:t>category_name_10.txt</a:t>
+              <a:t>Category: Category 6.txt</a:t>
             </a:r>
             <a:endParaRPr lang="en-US" sz="1100"/>
           </a:p>
@@ -9845,7 +9845,7 @@
             <a:pPr algn="l"/>
             <a:r>
               <a:rPr lang="en-US" sz="4400"/>
-              <a:t>Question 10 of 10 in round 4</a:t>
+              <a:t>Question 10 of 10 in round 3</a:t>
             </a:r>
             <a:endParaRPr lang="en-US" sz="1100"/>
           </a:p>
@@ -9898,7 +9898,7 @@
             <a:pPr algn="l"/>
             <a:r>
               <a:rPr lang="en-US" sz="3600"/>
-              <a:t>Answer 1 of 10 in round 4</a:t>
+              <a:t>Answer 1 of 10 in round 3</a:t>
             </a:r>
             <a:endParaRPr lang="en-US" sz="1100"/>
           </a:p>
@@ -9926,7 +9926,7 @@
             <a:pPr algn="l"/>
             <a:r>
               <a:rPr lang="en-US" sz="3600"/>
-              <a:t>Answer 2 of 10 in round 4</a:t>
+              <a:t>Answer 2 of 10 in round 3</a:t>
             </a:r>
             <a:endParaRPr lang="en-US" sz="1100"/>
           </a:p>
@@ -9954,7 +9954,7 @@
             <a:pPr algn="l"/>
             <a:r>
               <a:rPr lang="en-US" sz="3600"/>
-              <a:t>Answer 3 of 10 in round 4</a:t>
+              <a:t>Answer 3 of 10 in round 3</a:t>
             </a:r>
             <a:endParaRPr lang="en-US" sz="1100"/>
           </a:p>
@@ -9982,7 +9982,7 @@
             <a:pPr algn="l"/>
             <a:r>
               <a:rPr lang="en-US" sz="3600"/>
-              <a:t>Answer 4 of 10 in round 4</a:t>
+              <a:t>Answer 4 of 10 in round 3</a:t>
             </a:r>
             <a:endParaRPr lang="en-US" sz="1100"/>
           </a:p>
@@ -10010,7 +10010,7 @@
             <a:pPr algn="l"/>
             <a:r>
               <a:rPr lang="en-US" sz="3600"/>
-              <a:t>Answer 5 of 10 in round 4</a:t>
+              <a:t>Answer 5 of 10 in round 3</a:t>
             </a:r>
             <a:endParaRPr lang="en-US" sz="1100"/>
           </a:p>
@@ -10038,7 +10038,7 @@
             <a:pPr algn="l"/>
             <a:r>
               <a:rPr lang="en-US" sz="3600"/>
-              <a:t>Answer 6 of 10 in round 4</a:t>
+              <a:t>Answer 6 of 10 in round 3</a:t>
             </a:r>
             <a:endParaRPr lang="en-US" sz="1100"/>
           </a:p>
@@ -10066,7 +10066,7 @@
             <a:pPr algn="l"/>
             <a:r>
               <a:rPr lang="en-US" sz="3600"/>
-              <a:t>Answer 7 of 10 in round 4</a:t>
+              <a:t>Answer 7 of 10 in round 3</a:t>
             </a:r>
             <a:endParaRPr lang="en-US" sz="1100"/>
           </a:p>
@@ -10094,7 +10094,7 @@
             <a:pPr algn="l"/>
             <a:r>
               <a:rPr lang="en-US" sz="3600"/>
-              <a:t>Answer 8 of 10 in round 4</a:t>
+              <a:t>Answer 8 of 10 in round 3</a:t>
             </a:r>
             <a:endParaRPr lang="en-US" sz="1100"/>
           </a:p>
@@ -10122,7 +10122,7 @@
             <a:pPr algn="l"/>
             <a:r>
               <a:rPr lang="en-US" sz="3600"/>
-              <a:t>Answer 9 of 10 in round 4</a:t>
+              <a:t>Answer 9 of 10 in round 3</a:t>
             </a:r>
             <a:endParaRPr lang="en-US" sz="1100"/>
           </a:p>
@@ -10150,7 +10150,7 @@
             <a:pPr algn="l"/>
             <a:r>
               <a:rPr lang="en-US" sz="3600"/>
-              <a:t>Answer 10 of 10 in round 4</a:t>
+              <a:t>Answer 10 of 10 in round 3</a:t>
             </a:r>
             <a:endParaRPr lang="en-US" sz="1100"/>
           </a:p>
@@ -10379,7 +10379,7 @@
             <a:pPr algn="l"/>
             <a:r>
               <a:rPr lang="en-US" sz="3600"/>
-              <a:t>category_name_04.txt</a:t>
+              <a:t>Category: Category 1.txt</a:t>
             </a:r>
             <a:endParaRPr lang="en-US" sz="1100"/>
           </a:p>
@@ -10460,7 +10460,7 @@
             <a:pPr algn="l"/>
             <a:r>
               <a:rPr lang="en-US" sz="3600"/>
-              <a:t>category_name_01.txt</a:t>
+              <a:t>Category: Category 8.txt</a:t>
             </a:r>
             <a:endParaRPr lang="en-US" sz="1100"/>
           </a:p>
@@ -10488,7 +10488,7 @@
             <a:pPr algn="l"/>
             <a:r>
               <a:rPr lang="en-US" sz="4400"/>
-              <a:t>Question 1 of 10 in round 5</a:t>
+              <a:t>Question 1 of 10 in round 4</a:t>
             </a:r>
             <a:endParaRPr lang="en-US" sz="1100"/>
           </a:p>
@@ -10541,7 +10541,7 @@
             <a:pPr algn="l"/>
             <a:r>
               <a:rPr lang="en-US" sz="3600"/>
-              <a:t>category_name_02.txt</a:t>
+              <a:t>Category: Category 8.txt</a:t>
             </a:r>
             <a:endParaRPr lang="en-US" sz="1100"/>
           </a:p>
@@ -10569,7 +10569,7 @@
             <a:pPr algn="l"/>
             <a:r>
               <a:rPr lang="en-US" sz="4400"/>
-              <a:t>Question 2 of 10 in round 5</a:t>
+              <a:t>Question 2 of 10 in round 4</a:t>
             </a:r>
             <a:endParaRPr lang="en-US" sz="1100"/>
           </a:p>
@@ -10622,7 +10622,7 @@
             <a:pPr algn="l"/>
             <a:r>
               <a:rPr lang="en-US" sz="3600"/>
-              <a:t>category_name_03.txt</a:t>
+              <a:t>Category: Category 8.txt</a:t>
             </a:r>
             <a:endParaRPr lang="en-US" sz="1100"/>
           </a:p>
@@ -10650,7 +10650,7 @@
             <a:pPr algn="l"/>
             <a:r>
               <a:rPr lang="en-US" sz="4400"/>
-              <a:t>Question 3 of 10 in round 5</a:t>
+              <a:t>Question 3 of 10 in round 4</a:t>
             </a:r>
             <a:endParaRPr lang="en-US" sz="1100"/>
           </a:p>
@@ -10703,7 +10703,7 @@
             <a:pPr algn="l"/>
             <a:r>
               <a:rPr lang="en-US" sz="3600"/>
-              <a:t>category_name_04.txt</a:t>
+              <a:t>Category: Category 8.txt</a:t>
             </a:r>
             <a:endParaRPr lang="en-US" sz="1100"/>
           </a:p>
@@ -10731,7 +10731,7 @@
             <a:pPr algn="l"/>
             <a:r>
               <a:rPr lang="en-US" sz="4400"/>
-              <a:t>Question 4 of 10 in round 5</a:t>
+              <a:t>Question 4 of 10 in round 4</a:t>
             </a:r>
             <a:endParaRPr lang="en-US" sz="1100"/>
           </a:p>
@@ -10784,7 +10784,7 @@
             <a:pPr algn="l"/>
             <a:r>
               <a:rPr lang="en-US" sz="3600"/>
-              <a:t>category_name_05.txt</a:t>
+              <a:t>Category: Category 8.txt</a:t>
             </a:r>
             <a:endParaRPr lang="en-US" sz="1100"/>
           </a:p>
@@ -10812,7 +10812,7 @@
             <a:pPr algn="l"/>
             <a:r>
               <a:rPr lang="en-US" sz="4400"/>
-              <a:t>Question 5 of 10 in round 5</a:t>
+              <a:t>Question 5 of 10 in round 4</a:t>
             </a:r>
             <a:endParaRPr lang="en-US" sz="1100"/>
           </a:p>
@@ -10865,7 +10865,7 @@
             <a:pPr algn="l"/>
             <a:r>
               <a:rPr lang="en-US" sz="3600"/>
-              <a:t>category_name_06.txt</a:t>
+              <a:t>Category: Category 8.txt</a:t>
             </a:r>
             <a:endParaRPr lang="en-US" sz="1100"/>
           </a:p>
@@ -10893,7 +10893,7 @@
             <a:pPr algn="l"/>
             <a:r>
               <a:rPr lang="en-US" sz="4400"/>
-              <a:t>Question 6 of 10 in round 5</a:t>
+              <a:t>Question 6 of 10 in round 4</a:t>
             </a:r>
             <a:endParaRPr lang="en-US" sz="1100"/>
           </a:p>
@@ -10946,7 +10946,7 @@
             <a:pPr algn="l"/>
             <a:r>
               <a:rPr lang="en-US" sz="3600"/>
-              <a:t>category_name_07.txt</a:t>
+              <a:t>Category: Category 8.txt</a:t>
             </a:r>
             <a:endParaRPr lang="en-US" sz="1100"/>
           </a:p>
@@ -10974,7 +10974,7 @@
             <a:pPr algn="l"/>
             <a:r>
               <a:rPr lang="en-US" sz="4400"/>
-              <a:t>Question 7 of 10 in round 5</a:t>
+              <a:t>Question 7 of 10 in round 4</a:t>
             </a:r>
             <a:endParaRPr lang="en-US" sz="1100"/>
           </a:p>
@@ -11027,7 +11027,7 @@
             <a:pPr algn="l"/>
             <a:r>
               <a:rPr lang="en-US" sz="3600"/>
-              <a:t>category_name_08.txt</a:t>
+              <a:t>Category: Category 8.txt</a:t>
             </a:r>
             <a:endParaRPr lang="en-US" sz="1100"/>
           </a:p>
@@ -11055,7 +11055,7 @@
             <a:pPr algn="l"/>
             <a:r>
               <a:rPr lang="en-US" sz="4400"/>
-              <a:t>Question 8 of 10 in round 5</a:t>
+              <a:t>Question 8 of 10 in round 4</a:t>
             </a:r>
             <a:endParaRPr lang="en-US" sz="1100"/>
           </a:p>
@@ -11108,7 +11108,7 @@
             <a:pPr algn="l"/>
             <a:r>
               <a:rPr lang="en-US" sz="3600"/>
-              <a:t>category_name_09.txt</a:t>
+              <a:t>Category: Category 8.txt</a:t>
             </a:r>
             <a:endParaRPr lang="en-US" sz="1100"/>
           </a:p>
@@ -11136,7 +11136,7 @@
             <a:pPr algn="l"/>
             <a:r>
               <a:rPr lang="en-US" sz="4400"/>
-              <a:t>Question 9 of 10 in round 5</a:t>
+              <a:t>Question 9 of 10 in round 4</a:t>
             </a:r>
             <a:endParaRPr lang="en-US" sz="1100"/>
           </a:p>
@@ -11189,7 +11189,7 @@
             <a:pPr algn="l"/>
             <a:r>
               <a:rPr lang="en-US" sz="3600"/>
-              <a:t>category_name_10.txt</a:t>
+              <a:t>Category: Category 8.txt</a:t>
             </a:r>
             <a:endParaRPr lang="en-US" sz="1100"/>
           </a:p>
@@ -11217,7 +11217,7 @@
             <a:pPr algn="l"/>
             <a:r>
               <a:rPr lang="en-US" sz="4400"/>
-              <a:t>Question 10 of 10 in round 5</a:t>
+              <a:t>Question 10 of 10 in round 4</a:t>
             </a:r>
             <a:endParaRPr lang="en-US" sz="1100"/>
           </a:p>
@@ -11270,7 +11270,7 @@
             <a:pPr algn="l"/>
             <a:r>
               <a:rPr lang="en-US" sz="3600"/>
-              <a:t>category_name_05.txt</a:t>
+              <a:t>Category: Category 1.txt</a:t>
             </a:r>
             <a:endParaRPr lang="en-US" sz="1100"/>
           </a:p>
@@ -11351,7 +11351,7 @@
             <a:pPr algn="l"/>
             <a:r>
               <a:rPr lang="en-US" sz="3600"/>
-              <a:t>Answer 1 of 10 in round 5</a:t>
+              <a:t>Answer 1 of 10 in round 4</a:t>
             </a:r>
             <a:endParaRPr lang="en-US" sz="1100"/>
           </a:p>
@@ -11379,7 +11379,7 @@
             <a:pPr algn="l"/>
             <a:r>
               <a:rPr lang="en-US" sz="3600"/>
-              <a:t>Answer 2 of 10 in round 5</a:t>
+              <a:t>Answer 2 of 10 in round 4</a:t>
             </a:r>
             <a:endParaRPr lang="en-US" sz="1100"/>
           </a:p>
@@ -11407,7 +11407,7 @@
             <a:pPr algn="l"/>
             <a:r>
               <a:rPr lang="en-US" sz="3600"/>
-              <a:t>Answer 3 of 10 in round 5</a:t>
+              <a:t>Answer 3 of 10 in round 4</a:t>
             </a:r>
             <a:endParaRPr lang="en-US" sz="1100"/>
           </a:p>
@@ -11435,7 +11435,7 @@
             <a:pPr algn="l"/>
             <a:r>
               <a:rPr lang="en-US" sz="3600"/>
-              <a:t>Answer 4 of 10 in round 5</a:t>
+              <a:t>Answer 4 of 10 in round 4</a:t>
             </a:r>
             <a:endParaRPr lang="en-US" sz="1100"/>
           </a:p>
@@ -11463,7 +11463,7 @@
             <a:pPr algn="l"/>
             <a:r>
               <a:rPr lang="en-US" sz="3600"/>
-              <a:t>Answer 5 of 10 in round 5</a:t>
+              <a:t>Answer 5 of 10 in round 4</a:t>
             </a:r>
             <a:endParaRPr lang="en-US" sz="1100"/>
           </a:p>
@@ -11491,7 +11491,7 @@
             <a:pPr algn="l"/>
             <a:r>
               <a:rPr lang="en-US" sz="3600"/>
-              <a:t>Answer 6 of 10 in round 5</a:t>
+              <a:t>Answer 6 of 10 in round 4</a:t>
             </a:r>
             <a:endParaRPr lang="en-US" sz="1100"/>
           </a:p>
@@ -11519,7 +11519,7 @@
             <a:pPr algn="l"/>
             <a:r>
               <a:rPr lang="en-US" sz="3600"/>
-              <a:t>Answer 7 of 10 in round 5</a:t>
+              <a:t>Answer 7 of 10 in round 4</a:t>
             </a:r>
             <a:endParaRPr lang="en-US" sz="1100"/>
           </a:p>
@@ -11547,7 +11547,7 @@
             <a:pPr algn="l"/>
             <a:r>
               <a:rPr lang="en-US" sz="3600"/>
-              <a:t>Answer 8 of 10 in round 5</a:t>
+              <a:t>Answer 8 of 10 in round 4</a:t>
             </a:r>
             <a:endParaRPr lang="en-US" sz="1100"/>
           </a:p>
@@ -11575,7 +11575,7 @@
             <a:pPr algn="l"/>
             <a:r>
               <a:rPr lang="en-US" sz="3600"/>
-              <a:t>Answer 9 of 10 in round 5</a:t>
+              <a:t>Answer 9 of 10 in round 4</a:t>
             </a:r>
             <a:endParaRPr lang="en-US" sz="1100"/>
           </a:p>
@@ -11603,7 +11603,7 @@
             <a:pPr algn="l"/>
             <a:r>
               <a:rPr lang="en-US" sz="3600"/>
-              <a:t>Answer 10 of 10 in round 5</a:t>
+              <a:t>Answer 10 of 10 in round 4</a:t>
             </a:r>
             <a:endParaRPr lang="en-US" sz="1100"/>
           </a:p>
@@ -11832,7 +11832,7 @@
             <a:pPr algn="l"/>
             <a:r>
               <a:rPr lang="en-US" sz="3600"/>
-              <a:t>category_name_01.txt</a:t>
+              <a:t>Category: Category 10.txt</a:t>
             </a:r>
             <a:endParaRPr lang="en-US" sz="1100"/>
           </a:p>
@@ -11860,7 +11860,7 @@
             <a:pPr algn="l"/>
             <a:r>
               <a:rPr lang="en-US" sz="4400"/>
-              <a:t>Question 1 of 10 in round 6</a:t>
+              <a:t>Question 1 of 10 in round 5</a:t>
             </a:r>
             <a:endParaRPr lang="en-US" sz="1100"/>
           </a:p>
@@ -11913,7 +11913,7 @@
             <a:pPr algn="l"/>
             <a:r>
               <a:rPr lang="en-US" sz="3600"/>
-              <a:t>category_name_02.txt</a:t>
+              <a:t>Category: Category 10.txt</a:t>
             </a:r>
             <a:endParaRPr lang="en-US" sz="1100"/>
           </a:p>
@@ -11941,7 +11941,7 @@
             <a:pPr algn="l"/>
             <a:r>
               <a:rPr lang="en-US" sz="4400"/>
-              <a:t>Question 2 of 10 in round 6</a:t>
+              <a:t>Question 2 of 10 in round 5</a:t>
             </a:r>
             <a:endParaRPr lang="en-US" sz="1100"/>
           </a:p>
@@ -11994,7 +11994,7 @@
             <a:pPr algn="l"/>
             <a:r>
               <a:rPr lang="en-US" sz="3600"/>
-              <a:t>category_name_03.txt</a:t>
+              <a:t>Category: Category 10.txt</a:t>
             </a:r>
             <a:endParaRPr lang="en-US" sz="1100"/>
           </a:p>
@@ -12022,7 +12022,7 @@
             <a:pPr algn="l"/>
             <a:r>
               <a:rPr lang="en-US" sz="4400"/>
-              <a:t>Question 3 of 10 in round 6</a:t>
+              <a:t>Question 3 of 10 in round 5</a:t>
             </a:r>
             <a:endParaRPr lang="en-US" sz="1100"/>
           </a:p>
@@ -12075,7 +12075,7 @@
             <a:pPr algn="l"/>
             <a:r>
               <a:rPr lang="en-US" sz="3600"/>
-              <a:t>category_name_04.txt</a:t>
+              <a:t>Category: Category 10.txt</a:t>
             </a:r>
             <a:endParaRPr lang="en-US" sz="1100"/>
           </a:p>
@@ -12103,7 +12103,7 @@
             <a:pPr algn="l"/>
             <a:r>
               <a:rPr lang="en-US" sz="4400"/>
-              <a:t>Question 4 of 10 in round 6</a:t>
+              <a:t>Question 4 of 10 in round 5</a:t>
             </a:r>
             <a:endParaRPr lang="en-US" sz="1100"/>
           </a:p>
@@ -12156,7 +12156,7 @@
             <a:pPr algn="l"/>
             <a:r>
               <a:rPr lang="en-US" sz="3600"/>
-              <a:t>category_name_05.txt</a:t>
+              <a:t>Category: Category 10.txt</a:t>
             </a:r>
             <a:endParaRPr lang="en-US" sz="1100"/>
           </a:p>
@@ -12184,7 +12184,7 @@
             <a:pPr algn="l"/>
             <a:r>
               <a:rPr lang="en-US" sz="4400"/>
-              <a:t>Question 5 of 10 in round 6</a:t>
+              <a:t>Question 5 of 10 in round 5</a:t>
             </a:r>
             <a:endParaRPr lang="en-US" sz="1100"/>
           </a:p>
@@ -12237,7 +12237,7 @@
             <a:pPr algn="l"/>
             <a:r>
               <a:rPr lang="en-US" sz="3600"/>
-              <a:t>category_name_06.txt</a:t>
+              <a:t>Category: Category 10.txt</a:t>
             </a:r>
             <a:endParaRPr lang="en-US" sz="1100"/>
           </a:p>
@@ -12265,7 +12265,7 @@
             <a:pPr algn="l"/>
             <a:r>
               <a:rPr lang="en-US" sz="4400"/>
-              <a:t>Question 6 of 10 in round 6</a:t>
+              <a:t>Question 6 of 10 in round 5</a:t>
             </a:r>
             <a:endParaRPr lang="en-US" sz="1100"/>
           </a:p>
@@ -12318,7 +12318,7 @@
             <a:pPr algn="l"/>
             <a:r>
               <a:rPr lang="en-US" sz="3600"/>
-              <a:t>category_name_07.txt</a:t>
+              <a:t>Category: Category 10.txt</a:t>
             </a:r>
             <a:endParaRPr lang="en-US" sz="1100"/>
           </a:p>
@@ -12346,7 +12346,7 @@
             <a:pPr algn="l"/>
             <a:r>
               <a:rPr lang="en-US" sz="4400"/>
-              <a:t>Question 7 of 10 in round 6</a:t>
+              <a:t>Question 7 of 10 in round 5</a:t>
             </a:r>
             <a:endParaRPr lang="en-US" sz="1100"/>
           </a:p>
@@ -12399,7 +12399,7 @@
             <a:pPr algn="l"/>
             <a:r>
               <a:rPr lang="en-US" sz="3600"/>
-              <a:t>category_name_08.txt</a:t>
+              <a:t>Category: Category 10.txt</a:t>
             </a:r>
             <a:endParaRPr lang="en-US" sz="1100"/>
           </a:p>
@@ -12427,7 +12427,7 @@
             <a:pPr algn="l"/>
             <a:r>
               <a:rPr lang="en-US" sz="4400"/>
-              <a:t>Question 8 of 10 in round 6</a:t>
+              <a:t>Question 8 of 10 in round 5</a:t>
             </a:r>
             <a:endParaRPr lang="en-US" sz="1100"/>
           </a:p>
@@ -12480,7 +12480,7 @@
             <a:pPr algn="l"/>
             <a:r>
               <a:rPr lang="en-US" sz="3600"/>
-              <a:t>category_name_06.txt</a:t>
+              <a:t>Category: Category 1.txt</a:t>
             </a:r>
             <a:endParaRPr lang="en-US" sz="1100"/>
           </a:p>
@@ -12561,7 +12561,7 @@
             <a:pPr algn="l"/>
             <a:r>
               <a:rPr lang="en-US" sz="3600"/>
-              <a:t>category_name_09.txt</a:t>
+              <a:t>Category: Category 10.txt</a:t>
             </a:r>
             <a:endParaRPr lang="en-US" sz="1100"/>
           </a:p>
@@ -12589,7 +12589,7 @@
             <a:pPr algn="l"/>
             <a:r>
               <a:rPr lang="en-US" sz="4400"/>
-              <a:t>Question 9 of 10 in round 6</a:t>
+              <a:t>Question 9 of 10 in round 5</a:t>
             </a:r>
             <a:endParaRPr lang="en-US" sz="1100"/>
           </a:p>
@@ -12642,7 +12642,7 @@
             <a:pPr algn="l"/>
             <a:r>
               <a:rPr lang="en-US" sz="3600"/>
-              <a:t>category_name_10.txt</a:t>
+              <a:t>Category: Category 10.txt</a:t>
             </a:r>
             <a:endParaRPr lang="en-US" sz="1100"/>
           </a:p>
@@ -12670,7 +12670,7 @@
             <a:pPr algn="l"/>
             <a:r>
               <a:rPr lang="en-US" sz="4400"/>
-              <a:t>Question 10 of 10 in round 6</a:t>
+              <a:t>Question 10 of 10 in round 5</a:t>
             </a:r>
             <a:endParaRPr lang="en-US" sz="1100"/>
           </a:p>
@@ -12723,7 +12723,7 @@
             <a:pPr algn="l"/>
             <a:r>
               <a:rPr lang="en-US" sz="3600"/>
-              <a:t>Answer 1 of 10 in round 6</a:t>
+              <a:t>Answer 1 of 10 in round 5</a:t>
             </a:r>
             <a:endParaRPr lang="en-US" sz="1100"/>
           </a:p>
@@ -12751,7 +12751,7 @@
             <a:pPr algn="l"/>
             <a:r>
               <a:rPr lang="en-US" sz="3600"/>
-              <a:t>Answer 2 of 10 in round 6</a:t>
+              <a:t>Answer 2 of 10 in round 5</a:t>
             </a:r>
             <a:endParaRPr lang="en-US" sz="1100"/>
           </a:p>
@@ -12779,7 +12779,7 @@
             <a:pPr algn="l"/>
             <a:r>
               <a:rPr lang="en-US" sz="3600"/>
-              <a:t>Answer 3 of 10 in round 6</a:t>
+              <a:t>Answer 3 of 10 in round 5</a:t>
             </a:r>
             <a:endParaRPr lang="en-US" sz="1100"/>
           </a:p>
@@ -12807,7 +12807,7 @@
             <a:pPr algn="l"/>
             <a:r>
               <a:rPr lang="en-US" sz="3600"/>
-              <a:t>Answer 4 of 10 in round 6</a:t>
+              <a:t>Answer 4 of 10 in round 5</a:t>
             </a:r>
             <a:endParaRPr lang="en-US" sz="1100"/>
           </a:p>
@@ -12835,7 +12835,7 @@
             <a:pPr algn="l"/>
             <a:r>
               <a:rPr lang="en-US" sz="3600"/>
-              <a:t>Answer 5 of 10 in round 6</a:t>
+              <a:t>Answer 5 of 10 in round 5</a:t>
             </a:r>
             <a:endParaRPr lang="en-US" sz="1100"/>
           </a:p>
@@ -12863,7 +12863,7 @@
             <a:pPr algn="l"/>
             <a:r>
               <a:rPr lang="en-US" sz="3600"/>
-              <a:t>Answer 6 of 10 in round 6</a:t>
+              <a:t>Answer 6 of 10 in round 5</a:t>
             </a:r>
             <a:endParaRPr lang="en-US" sz="1100"/>
           </a:p>
@@ -12891,7 +12891,7 @@
             <a:pPr algn="l"/>
             <a:r>
               <a:rPr lang="en-US" sz="3600"/>
-              <a:t>Answer 7 of 10 in round 6</a:t>
+              <a:t>Answer 7 of 10 in round 5</a:t>
             </a:r>
             <a:endParaRPr lang="en-US" sz="1100"/>
           </a:p>
@@ -12919,7 +12919,7 @@
             <a:pPr algn="l"/>
             <a:r>
               <a:rPr lang="en-US" sz="3600"/>
-              <a:t>Answer 8 of 10 in round 6</a:t>
+              <a:t>Answer 8 of 10 in round 5</a:t>
             </a:r>
             <a:endParaRPr lang="en-US" sz="1100"/>
           </a:p>
@@ -12947,7 +12947,7 @@
             <a:pPr algn="l"/>
             <a:r>
               <a:rPr lang="en-US" sz="3600"/>
-              <a:t>Answer 9 of 10 in round 6</a:t>
+              <a:t>Answer 9 of 10 in round 5</a:t>
             </a:r>
             <a:endParaRPr lang="en-US" sz="1100"/>
           </a:p>
@@ -12975,7 +12975,7 @@
             <a:pPr algn="l"/>
             <a:r>
               <a:rPr lang="en-US" sz="3600"/>
-              <a:t>Answer 10 of 10 in round 6</a:t>
+              <a:t>Answer 10 of 10 in round 5</a:t>
             </a:r>
             <a:endParaRPr lang="en-US" sz="1100"/>
           </a:p>
@@ -13204,7 +13204,7 @@
             <a:pPr algn="l"/>
             <a:r>
               <a:rPr lang="en-US" sz="3600"/>
-              <a:t>category_name_01.txt</a:t>
+              <a:t>Category: Category 5.txt</a:t>
             </a:r>
             <a:endParaRPr lang="en-US" sz="1100"/>
           </a:p>
@@ -13232,7 +13232,7 @@
             <a:pPr algn="l"/>
             <a:r>
               <a:rPr lang="en-US" sz="4400"/>
-              <a:t>Question 1 of 10 in round 7</a:t>
+              <a:t>Question 1 of 10 in round 6</a:t>
             </a:r>
             <a:endParaRPr lang="en-US" sz="1100"/>
           </a:p>
@@ -13285,7 +13285,7 @@
             <a:pPr algn="l"/>
             <a:r>
               <a:rPr lang="en-US" sz="3600"/>
-              <a:t>category_name_02.txt</a:t>
+              <a:t>Category: Category 5.txt</a:t>
             </a:r>
             <a:endParaRPr lang="en-US" sz="1100"/>
           </a:p>
@@ -13313,7 +13313,7 @@
             <a:pPr algn="l"/>
             <a:r>
               <a:rPr lang="en-US" sz="4400"/>
-              <a:t>Question 2 of 10 in round 7</a:t>
+              <a:t>Question 2 of 10 in round 6</a:t>
             </a:r>
             <a:endParaRPr lang="en-US" sz="1100"/>
           </a:p>
@@ -13366,7 +13366,7 @@
             <a:pPr algn="l"/>
             <a:r>
               <a:rPr lang="en-US" sz="3600"/>
-              <a:t>category_name_03.txt</a:t>
+              <a:t>Category: Category 5.txt</a:t>
             </a:r>
             <a:endParaRPr lang="en-US" sz="1100"/>
           </a:p>
@@ -13394,7 +13394,7 @@
             <a:pPr algn="l"/>
             <a:r>
               <a:rPr lang="en-US" sz="4400"/>
-              <a:t>Question 3 of 10 in round 7</a:t>
+              <a:t>Question 3 of 10 in round 6</a:t>
             </a:r>
             <a:endParaRPr lang="en-US" sz="1100"/>
           </a:p>
@@ -13447,7 +13447,7 @@
             <a:pPr algn="l"/>
             <a:r>
               <a:rPr lang="en-US" sz="3600"/>
-              <a:t>category_name_04.txt</a:t>
+              <a:t>Category: Category 5.txt</a:t>
             </a:r>
             <a:endParaRPr lang="en-US" sz="1100"/>
           </a:p>
@@ -13475,7 +13475,7 @@
             <a:pPr algn="l"/>
             <a:r>
               <a:rPr lang="en-US" sz="4400"/>
-              <a:t>Question 4 of 10 in round 7</a:t>
+              <a:t>Question 4 of 10 in round 6</a:t>
             </a:r>
             <a:endParaRPr lang="en-US" sz="1100"/>
           </a:p>
@@ -13528,7 +13528,7 @@
             <a:pPr algn="l"/>
             <a:r>
               <a:rPr lang="en-US" sz="3600"/>
-              <a:t>category_name_05.txt</a:t>
+              <a:t>Category: Category 5.txt</a:t>
             </a:r>
             <a:endParaRPr lang="en-US" sz="1100"/>
           </a:p>
@@ -13556,7 +13556,7 @@
             <a:pPr algn="l"/>
             <a:r>
               <a:rPr lang="en-US" sz="4400"/>
-              <a:t>Question 5 of 10 in round 7</a:t>
+              <a:t>Question 5 of 10 in round 6</a:t>
             </a:r>
             <a:endParaRPr lang="en-US" sz="1100"/>
           </a:p>
@@ -13609,7 +13609,7 @@
             <a:pPr algn="l"/>
             <a:r>
               <a:rPr lang="en-US" sz="3600"/>
-              <a:t>category_name_06.txt</a:t>
+              <a:t>Category: Category 5.txt</a:t>
             </a:r>
             <a:endParaRPr lang="en-US" sz="1100"/>
           </a:p>
@@ -13637,7 +13637,7 @@
             <a:pPr algn="l"/>
             <a:r>
               <a:rPr lang="en-US" sz="4400"/>
-              <a:t>Question 6 of 10 in round 7</a:t>
+              <a:t>Question 6 of 10 in round 6</a:t>
             </a:r>
             <a:endParaRPr lang="en-US" sz="1100"/>
           </a:p>
@@ -13690,7 +13690,7 @@
             <a:pPr algn="l"/>
             <a:r>
               <a:rPr lang="en-US" sz="3600"/>
-              <a:t>category_name_07.txt</a:t>
+              <a:t>Category: Category 1.txt</a:t>
             </a:r>
             <a:endParaRPr lang="en-US" sz="1100"/>
           </a:p>
@@ -13771,7 +13771,7 @@
             <a:pPr algn="l"/>
             <a:r>
               <a:rPr lang="en-US" sz="3600"/>
-              <a:t>category_name_07.txt</a:t>
+              <a:t>Category: Category 5.txt</a:t>
             </a:r>
             <a:endParaRPr lang="en-US" sz="1100"/>
           </a:p>
@@ -13799,7 +13799,7 @@
             <a:pPr algn="l"/>
             <a:r>
               <a:rPr lang="en-US" sz="4400"/>
-              <a:t>Question 7 of 10 in round 7</a:t>
+              <a:t>Question 7 of 10 in round 6</a:t>
             </a:r>
             <a:endParaRPr lang="en-US" sz="1100"/>
           </a:p>
@@ -13852,7 +13852,7 @@
             <a:pPr algn="l"/>
             <a:r>
               <a:rPr lang="en-US" sz="3600"/>
-              <a:t>category_name_08.txt</a:t>
+              <a:t>Category: Category 5.txt</a:t>
             </a:r>
             <a:endParaRPr lang="en-US" sz="1100"/>
           </a:p>
@@ -13880,7 +13880,7 @@
             <a:pPr algn="l"/>
             <a:r>
               <a:rPr lang="en-US" sz="4400"/>
-              <a:t>Question 8 of 10 in round 7</a:t>
+              <a:t>Question 8 of 10 in round 6</a:t>
             </a:r>
             <a:endParaRPr lang="en-US" sz="1100"/>
           </a:p>
@@ -13933,7 +13933,7 @@
             <a:pPr algn="l"/>
             <a:r>
               <a:rPr lang="en-US" sz="3600"/>
-              <a:t>category_name_09.txt</a:t>
+              <a:t>Category: Category 5.txt</a:t>
             </a:r>
             <a:endParaRPr lang="en-US" sz="1100"/>
           </a:p>
@@ -13961,7 +13961,7 @@
             <a:pPr algn="l"/>
             <a:r>
               <a:rPr lang="en-US" sz="4400"/>
-              <a:t>Question 9 of 10 in round 7</a:t>
+              <a:t>Question 9 of 10 in round 6</a:t>
             </a:r>
             <a:endParaRPr lang="en-US" sz="1100"/>
           </a:p>
@@ -14014,7 +14014,7 @@
             <a:pPr algn="l"/>
             <a:r>
               <a:rPr lang="en-US" sz="3600"/>
-              <a:t>category_name_10.txt</a:t>
+              <a:t>Category: Category 5.txt</a:t>
             </a:r>
             <a:endParaRPr lang="en-US" sz="1100"/>
           </a:p>
@@ -14042,7 +14042,7 @@
             <a:pPr algn="l"/>
             <a:r>
               <a:rPr lang="en-US" sz="4400"/>
-              <a:t>Question 10 of 10 in round 7</a:t>
+              <a:t>Question 10 of 10 in round 6</a:t>
             </a:r>
             <a:endParaRPr lang="en-US" sz="1100"/>
           </a:p>
@@ -14095,7 +14095,7 @@
             <a:pPr algn="l"/>
             <a:r>
               <a:rPr lang="en-US" sz="3600"/>
-              <a:t>Answer 1 of 10 in round 7</a:t>
+              <a:t>Answer 1 of 10 in round 6</a:t>
             </a:r>
             <a:endParaRPr lang="en-US" sz="1100"/>
           </a:p>
@@ -14123,7 +14123,7 @@
             <a:pPr algn="l"/>
             <a:r>
               <a:rPr lang="en-US" sz="3600"/>
-              <a:t>Answer 2 of 10 in round 7</a:t>
+              <a:t>Answer 2 of 10 in round 6</a:t>
             </a:r>
             <a:endParaRPr lang="en-US" sz="1100"/>
           </a:p>
@@ -14151,7 +14151,7 @@
             <a:pPr algn="l"/>
             <a:r>
               <a:rPr lang="en-US" sz="3600"/>
-              <a:t>Answer 3 of 10 in round 7</a:t>
+              <a:t>Answer 3 of 10 in round 6</a:t>
             </a:r>
             <a:endParaRPr lang="en-US" sz="1100"/>
           </a:p>
@@ -14179,7 +14179,7 @@
             <a:pPr algn="l"/>
             <a:r>
               <a:rPr lang="en-US" sz="3600"/>
-              <a:t>Answer 4 of 10 in round 7</a:t>
+              <a:t>Answer 4 of 10 in round 6</a:t>
             </a:r>
             <a:endParaRPr lang="en-US" sz="1100"/>
           </a:p>
@@ -14207,7 +14207,7 @@
             <a:pPr algn="l"/>
             <a:r>
               <a:rPr lang="en-US" sz="3600"/>
-              <a:t>Answer 5 of 10 in round 7</a:t>
+              <a:t>Answer 5 of 10 in round 6</a:t>
             </a:r>
             <a:endParaRPr lang="en-US" sz="1100"/>
           </a:p>
@@ -14235,7 +14235,7 @@
             <a:pPr algn="l"/>
             <a:r>
               <a:rPr lang="en-US" sz="3600"/>
-              <a:t>Answer 6 of 10 in round 7</a:t>
+              <a:t>Answer 6 of 10 in round 6</a:t>
             </a:r>
             <a:endParaRPr lang="en-US" sz="1100"/>
           </a:p>
@@ -14263,7 +14263,7 @@
             <a:pPr algn="l"/>
             <a:r>
               <a:rPr lang="en-US" sz="3600"/>
-              <a:t>Answer 7 of 10 in round 7</a:t>
+              <a:t>Answer 7 of 10 in round 6</a:t>
             </a:r>
             <a:endParaRPr lang="en-US" sz="1100"/>
           </a:p>
@@ -14291,7 +14291,7 @@
             <a:pPr algn="l"/>
             <a:r>
               <a:rPr lang="en-US" sz="3600"/>
-              <a:t>Answer 8 of 10 in round 7</a:t>
+              <a:t>Answer 8 of 10 in round 6</a:t>
             </a:r>
             <a:endParaRPr lang="en-US" sz="1100"/>
           </a:p>
@@ -14319,7 +14319,7 @@
             <a:pPr algn="l"/>
             <a:r>
               <a:rPr lang="en-US" sz="3600"/>
-              <a:t>Answer 9 of 10 in round 7</a:t>
+              <a:t>Answer 9 of 10 in round 6</a:t>
             </a:r>
             <a:endParaRPr lang="en-US" sz="1100"/>
           </a:p>
@@ -14347,7 +14347,7 @@
             <a:pPr algn="l"/>
             <a:r>
               <a:rPr lang="en-US" sz="3600"/>
-              <a:t>Answer 10 of 10 in round 7</a:t>
+              <a:t>Answer 10 of 10 in round 6</a:t>
             </a:r>
             <a:endParaRPr lang="en-US" sz="1100"/>
           </a:p>
@@ -14576,7 +14576,7 @@
             <a:pPr algn="l"/>
             <a:r>
               <a:rPr lang="en-US" sz="3600"/>
-              <a:t>category_name_01.txt</a:t>
+              <a:t>Category: Category 9.txt</a:t>
             </a:r>
             <a:endParaRPr lang="en-US" sz="1100"/>
           </a:p>
@@ -14604,7 +14604,7 @@
             <a:pPr algn="l"/>
             <a:r>
               <a:rPr lang="en-US" sz="4400"/>
-              <a:t>Question 1 of 10 in round 8</a:t>
+              <a:t>Question 1 of 10 in round 7</a:t>
             </a:r>
             <a:endParaRPr lang="en-US" sz="1100"/>
           </a:p>
@@ -14657,7 +14657,7 @@
             <a:pPr algn="l"/>
             <a:r>
               <a:rPr lang="en-US" sz="3600"/>
-              <a:t>category_name_02.txt</a:t>
+              <a:t>Category: Category 9.txt</a:t>
             </a:r>
             <a:endParaRPr lang="en-US" sz="1100"/>
           </a:p>
@@ -14685,7 +14685,7 @@
             <a:pPr algn="l"/>
             <a:r>
               <a:rPr lang="en-US" sz="4400"/>
-              <a:t>Question 2 of 10 in round 8</a:t>
+              <a:t>Question 2 of 10 in round 7</a:t>
             </a:r>
             <a:endParaRPr lang="en-US" sz="1100"/>
           </a:p>
@@ -14738,7 +14738,7 @@
             <a:pPr algn="l"/>
             <a:r>
               <a:rPr lang="en-US" sz="3600"/>
-              <a:t>category_name_03.txt</a:t>
+              <a:t>Category: Category 9.txt</a:t>
             </a:r>
             <a:endParaRPr lang="en-US" sz="1100"/>
           </a:p>
@@ -14766,7 +14766,7 @@
             <a:pPr algn="l"/>
             <a:r>
               <a:rPr lang="en-US" sz="4400"/>
-              <a:t>Question 3 of 10 in round 8</a:t>
+              <a:t>Question 3 of 10 in round 7</a:t>
             </a:r>
             <a:endParaRPr lang="en-US" sz="1100"/>
           </a:p>
@@ -14819,7 +14819,7 @@
             <a:pPr algn="l"/>
             <a:r>
               <a:rPr lang="en-US" sz="3600"/>
-              <a:t>category_name_04.txt</a:t>
+              <a:t>Category: Category 9.txt</a:t>
             </a:r>
             <a:endParaRPr lang="en-US" sz="1100"/>
           </a:p>
@@ -14847,7 +14847,7 @@
             <a:pPr algn="l"/>
             <a:r>
               <a:rPr lang="en-US" sz="4400"/>
-              <a:t>Question 4 of 10 in round 8</a:t>
+              <a:t>Question 4 of 10 in round 7</a:t>
             </a:r>
             <a:endParaRPr lang="en-US" sz="1100"/>
           </a:p>
@@ -14900,7 +14900,7 @@
             <a:pPr algn="l"/>
             <a:r>
               <a:rPr lang="en-US" sz="3600"/>
-              <a:t>category_name_08.txt</a:t>
+              <a:t>Category: Category 1.txt</a:t>
             </a:r>
             <a:endParaRPr lang="en-US" sz="1100"/>
           </a:p>
@@ -14981,7 +14981,7 @@
             <a:pPr algn="l"/>
             <a:r>
               <a:rPr lang="en-US" sz="3600"/>
-              <a:t>category_name_05.txt</a:t>
+              <a:t>Category: Category 9.txt</a:t>
             </a:r>
             <a:endParaRPr lang="en-US" sz="1100"/>
           </a:p>
@@ -15009,7 +15009,7 @@
             <a:pPr algn="l"/>
             <a:r>
               <a:rPr lang="en-US" sz="4400"/>
-              <a:t>Question 5 of 10 in round 8</a:t>
+              <a:t>Question 5 of 10 in round 7</a:t>
             </a:r>
             <a:endParaRPr lang="en-US" sz="1100"/>
           </a:p>
@@ -15062,7 +15062,7 @@
             <a:pPr algn="l"/>
             <a:r>
               <a:rPr lang="en-US" sz="3600"/>
-              <a:t>category_name_06.txt</a:t>
+              <a:t>Category: Category 9.txt</a:t>
             </a:r>
             <a:endParaRPr lang="en-US" sz="1100"/>
           </a:p>
@@ -15090,7 +15090,7 @@
             <a:pPr algn="l"/>
             <a:r>
               <a:rPr lang="en-US" sz="4400"/>
-              <a:t>Question 6 of 10 in round 8</a:t>
+              <a:t>Question 6 of 10 in round 7</a:t>
             </a:r>
             <a:endParaRPr lang="en-US" sz="1100"/>
           </a:p>
@@ -15143,7 +15143,7 @@
             <a:pPr algn="l"/>
             <a:r>
               <a:rPr lang="en-US" sz="3600"/>
-              <a:t>category_name_07.txt</a:t>
+              <a:t>Category: Category 9.txt</a:t>
             </a:r>
             <a:endParaRPr lang="en-US" sz="1100"/>
           </a:p>
@@ -15171,7 +15171,7 @@
             <a:pPr algn="l"/>
             <a:r>
               <a:rPr lang="en-US" sz="4400"/>
-              <a:t>Question 7 of 10 in round 8</a:t>
+              <a:t>Question 7 of 10 in round 7</a:t>
             </a:r>
             <a:endParaRPr lang="en-US" sz="1100"/>
           </a:p>
@@ -15224,7 +15224,7 @@
             <a:pPr algn="l"/>
             <a:r>
               <a:rPr lang="en-US" sz="3600"/>
-              <a:t>category_name_08.txt</a:t>
+              <a:t>Category: Category 9.txt</a:t>
             </a:r>
             <a:endParaRPr lang="en-US" sz="1100"/>
           </a:p>
@@ -15252,7 +15252,7 @@
             <a:pPr algn="l"/>
             <a:r>
               <a:rPr lang="en-US" sz="4400"/>
-              <a:t>Question 8 of 10 in round 8</a:t>
+              <a:t>Question 8 of 10 in round 7</a:t>
             </a:r>
             <a:endParaRPr lang="en-US" sz="1100"/>
           </a:p>
@@ -15305,7 +15305,7 @@
             <a:pPr algn="l"/>
             <a:r>
               <a:rPr lang="en-US" sz="3600"/>
-              <a:t>category_name_09.txt</a:t>
+              <a:t>Category: Category 9.txt</a:t>
             </a:r>
             <a:endParaRPr lang="en-US" sz="1100"/>
           </a:p>
@@ -15333,7 +15333,7 @@
             <a:pPr algn="l"/>
             <a:r>
               <a:rPr lang="en-US" sz="4400"/>
-              <a:t>Question 9 of 10 in round 8</a:t>
+              <a:t>Question 9 of 10 in round 7</a:t>
             </a:r>
             <a:endParaRPr lang="en-US" sz="1100"/>
           </a:p>
@@ -15386,7 +15386,7 @@
             <a:pPr algn="l"/>
             <a:r>
               <a:rPr lang="en-US" sz="3600"/>
-              <a:t>category_name_10.txt</a:t>
+              <a:t>Category: Category 9.txt</a:t>
             </a:r>
             <a:endParaRPr lang="en-US" sz="1100"/>
           </a:p>
@@ -15414,7 +15414,7 @@
             <a:pPr algn="l"/>
             <a:r>
               <a:rPr lang="en-US" sz="4400"/>
-              <a:t>Question 10 of 10 in round 8</a:t>
+              <a:t>Question 10 of 10 in round 7</a:t>
             </a:r>
             <a:endParaRPr lang="en-US" sz="1100"/>
           </a:p>
@@ -15467,7 +15467,7 @@
             <a:pPr algn="l"/>
             <a:r>
               <a:rPr lang="en-US" sz="3600"/>
-              <a:t>Answer 1 of 10 in round 8</a:t>
+              <a:t>Answer 1 of 10 in round 7</a:t>
             </a:r>
             <a:endParaRPr lang="en-US" sz="1100"/>
           </a:p>
@@ -15495,7 +15495,7 @@
             <a:pPr algn="l"/>
             <a:r>
               <a:rPr lang="en-US" sz="3600"/>
-              <a:t>Answer 2 of 10 in round 8</a:t>
+              <a:t>Answer 2 of 10 in round 7</a:t>
             </a:r>
             <a:endParaRPr lang="en-US" sz="1100"/>
           </a:p>
@@ -15523,7 +15523,7 @@
             <a:pPr algn="l"/>
             <a:r>
               <a:rPr lang="en-US" sz="3600"/>
-              <a:t>Answer 3 of 10 in round 8</a:t>
+              <a:t>Answer 3 of 10 in round 7</a:t>
             </a:r>
             <a:endParaRPr lang="en-US" sz="1100"/>
           </a:p>
@@ -15551,7 +15551,7 @@
             <a:pPr algn="l"/>
             <a:r>
               <a:rPr lang="en-US" sz="3600"/>
-              <a:t>Answer 4 of 10 in round 8</a:t>
+              <a:t>Answer 4 of 10 in round 7</a:t>
             </a:r>
             <a:endParaRPr lang="en-US" sz="1100"/>
           </a:p>
@@ -15579,7 +15579,7 @@
             <a:pPr algn="l"/>
             <a:r>
               <a:rPr lang="en-US" sz="3600"/>
-              <a:t>Answer 5 of 10 in round 8</a:t>
+              <a:t>Answer 5 of 10 in round 7</a:t>
             </a:r>
             <a:endParaRPr lang="en-US" sz="1100"/>
           </a:p>
@@ -15607,7 +15607,7 @@
             <a:pPr algn="l"/>
             <a:r>
               <a:rPr lang="en-US" sz="3600"/>
-              <a:t>Answer 6 of 10 in round 8</a:t>
+              <a:t>Answer 6 of 10 in round 7</a:t>
             </a:r>
             <a:endParaRPr lang="en-US" sz="1100"/>
           </a:p>
@@ -15635,7 +15635,7 @@
             <a:pPr algn="l"/>
             <a:r>
               <a:rPr lang="en-US" sz="3600"/>
-              <a:t>Answer 7 of 10 in round 8</a:t>
+              <a:t>Answer 7 of 10 in round 7</a:t>
             </a:r>
             <a:endParaRPr lang="en-US" sz="1100"/>
           </a:p>
@@ -15663,7 +15663,7 @@
             <a:pPr algn="l"/>
             <a:r>
               <a:rPr lang="en-US" sz="3600"/>
-              <a:t>Answer 8 of 10 in round 8</a:t>
+              <a:t>Answer 8 of 10 in round 7</a:t>
             </a:r>
             <a:endParaRPr lang="en-US" sz="1100"/>
           </a:p>
@@ -15691,7 +15691,7 @@
             <a:pPr algn="l"/>
             <a:r>
               <a:rPr lang="en-US" sz="3600"/>
-              <a:t>Answer 9 of 10 in round 8</a:t>
+              <a:t>Answer 9 of 10 in round 7</a:t>
             </a:r>
             <a:endParaRPr lang="en-US" sz="1100"/>
           </a:p>
@@ -15719,7 +15719,7 @@
             <a:pPr algn="l"/>
             <a:r>
               <a:rPr lang="en-US" sz="3600"/>
-              <a:t>Answer 10 of 10 in round 8</a:t>
+              <a:t>Answer 10 of 10 in round 7</a:t>
             </a:r>
             <a:endParaRPr lang="en-US" sz="1100"/>
           </a:p>
@@ -15948,7 +15948,7 @@
             <a:pPr algn="l"/>
             <a:r>
               <a:rPr lang="en-US" sz="3600"/>
-              <a:t>category_name_01.txt</a:t>
+              <a:t>Category: Category 7.txt</a:t>
             </a:r>
             <a:endParaRPr lang="en-US" sz="1100"/>
           </a:p>
@@ -15976,7 +15976,7 @@
             <a:pPr algn="l"/>
             <a:r>
               <a:rPr lang="en-US" sz="4400"/>
-              <a:t>Question 1 of 10 in round 9</a:t>
+              <a:t>Question 1 of 10 in round 8</a:t>
             </a:r>
             <a:endParaRPr lang="en-US" sz="1100"/>
           </a:p>
@@ -16029,7 +16029,7 @@
             <a:pPr algn="l"/>
             <a:r>
               <a:rPr lang="en-US" sz="3600"/>
-              <a:t>category_name_02.txt</a:t>
+              <a:t>Category: Category 7.txt</a:t>
             </a:r>
             <a:endParaRPr lang="en-US" sz="1100"/>
           </a:p>
@@ -16057,7 +16057,7 @@
             <a:pPr algn="l"/>
             <a:r>
               <a:rPr lang="en-US" sz="4400"/>
-              <a:t>Question 2 of 10 in round 9</a:t>
+              <a:t>Question 2 of 10 in round 8</a:t>
             </a:r>
             <a:endParaRPr lang="en-US" sz="1100"/>
           </a:p>

</xml_diff>